<commit_message>
Up to date changes
</commit_message>
<xml_diff>
--- a/Final Analysis - Data Capstone Project - Data Breaches.pptx
+++ b/Final Analysis - Data Capstone Project - Data Breaches.pptx
@@ -15,6 +15,13 @@
     <p:sldId id="264" r:id="rId9"/>
     <p:sldId id="263" r:id="rId10"/>
     <p:sldId id="265" r:id="rId11"/>
+    <p:sldId id="266" r:id="rId12"/>
+    <p:sldId id="271" r:id="rId13"/>
+    <p:sldId id="268" r:id="rId14"/>
+    <p:sldId id="270" r:id="rId15"/>
+    <p:sldId id="267" r:id="rId16"/>
+    <p:sldId id="269" r:id="rId17"/>
+    <p:sldId id="272" r:id="rId18"/>
   </p:sldIdLst>
   <p:sldSz cx="9144000" cy="6858000" type="screen4x3"/>
   <p:notesSz cx="6858000" cy="9144000"/>
@@ -4792,7 +4799,7 @@
         </p:spPr>
         <p:txBody>
           <a:bodyPr>
-            <a:normAutofit fontScale="47500" lnSpcReduction="20000"/>
+            <a:normAutofit fontScale="55000" lnSpcReduction="20000"/>
           </a:bodyPr>
           <a:lstStyle/>
           <a:p>
@@ -4800,28 +4807,28 @@
               <a:buNone/>
             </a:pPr>
             <a:r>
-              <a:rPr lang="en-US" sz="5000" dirty="0">
+              <a:rPr lang="en-US" sz="4400" dirty="0">
                 <a:latin typeface="Calibri" panose="020F0502020204030204" pitchFamily="34" charset="0"/>
                 <a:cs typeface="Calibri" panose="020F0502020204030204" pitchFamily="34" charset="0"/>
               </a:rPr>
               <a:t>Data </a:t>
             </a:r>
             <a:r>
-              <a:rPr lang="en-US" sz="5000" dirty="0" smtClean="0">
-                <a:latin typeface="Calibri" panose="020F0502020204030204" pitchFamily="34" charset="0"/>
-                <a:cs typeface="Calibri" panose="020F0502020204030204" pitchFamily="34" charset="0"/>
-              </a:rPr>
-              <a:t>assessment, Transformation, Cleaning </a:t>
-            </a:r>
-            <a:r>
-              <a:rPr lang="en-US" sz="5000" dirty="0">
+              <a:rPr lang="en-US" sz="4400" dirty="0" smtClean="0">
+                <a:latin typeface="Calibri" panose="020F0502020204030204" pitchFamily="34" charset="0"/>
+                <a:cs typeface="Calibri" panose="020F0502020204030204" pitchFamily="34" charset="0"/>
+              </a:rPr>
+              <a:t>Assessment, Transformation, Cleaning </a:t>
+            </a:r>
+            <a:r>
+              <a:rPr lang="en-US" sz="4400" dirty="0">
                 <a:latin typeface="Calibri" panose="020F0502020204030204" pitchFamily="34" charset="0"/>
                 <a:cs typeface="Calibri" panose="020F0502020204030204" pitchFamily="34" charset="0"/>
               </a:rPr>
               <a:t>/ </a:t>
             </a:r>
             <a:r>
-              <a:rPr lang="en-US" sz="5000" dirty="0" smtClean="0">
+              <a:rPr lang="en-US" sz="4400" dirty="0" smtClean="0">
                 <a:latin typeface="Calibri" panose="020F0502020204030204" pitchFamily="34" charset="0"/>
                 <a:cs typeface="Calibri" panose="020F0502020204030204" pitchFamily="34" charset="0"/>
               </a:rPr>
@@ -4832,13 +4839,6 @@
             <a:pPr marL="109728" indent="0" algn="ctr">
               <a:buNone/>
             </a:pPr>
-            <a:r>
-              <a:rPr lang="en-US" sz="5000" dirty="0" smtClean="0">
-                <a:latin typeface="Calibri" panose="020F0502020204030204" pitchFamily="34" charset="0"/>
-                <a:cs typeface="Calibri" panose="020F0502020204030204" pitchFamily="34" charset="0"/>
-              </a:rPr>
-              <a:t>Data Cleaning</a:t>
-            </a:r>
             <a:endParaRPr lang="en-US" sz="3000" dirty="0">
               <a:latin typeface="Calibri" panose="020F0502020204030204" pitchFamily="34" charset="0"/>
               <a:cs typeface="Calibri" panose="020F0502020204030204" pitchFamily="34" charset="0"/>
@@ -4846,85 +4846,13 @@
           </a:p>
           <a:p>
             <a:r>
-              <a:rPr lang="en-US" sz="3600" dirty="0" smtClean="0">
-                <a:latin typeface="Calibri" panose="020F0502020204030204" pitchFamily="34" charset="0"/>
-                <a:cs typeface="Calibri" panose="020F0502020204030204" pitchFamily="34" charset="0"/>
-              </a:rPr>
-              <a:t>Column </a:t>
-            </a:r>
-            <a:r>
-              <a:rPr lang="en-US" sz="3600" dirty="0">
-                <a:latin typeface="Calibri" panose="020F0502020204030204" pitchFamily="34" charset="0"/>
-                <a:cs typeface="Calibri" panose="020F0502020204030204" pitchFamily="34" charset="0"/>
-              </a:rPr>
-              <a:t>name: City </a:t>
-            </a:r>
-          </a:p>
-          <a:p>
-            <a:pPr lvl="1"/>
-            <a:r>
-              <a:rPr lang="en-US" sz="3200" dirty="0">
-                <a:latin typeface="Calibri" panose="020F0502020204030204" pitchFamily="34" charset="0"/>
-                <a:cs typeface="Calibri" panose="020F0502020204030204" pitchFamily="34" charset="0"/>
-              </a:rPr>
-              <a:t>How resolved: Drop column. </a:t>
-            </a:r>
-          </a:p>
-          <a:p>
-            <a:pPr lvl="1"/>
-            <a:r>
-              <a:rPr lang="en-US" sz="3200" dirty="0">
-                <a:latin typeface="Calibri" panose="020F0502020204030204" pitchFamily="34" charset="0"/>
-                <a:cs typeface="Calibri" panose="020F0502020204030204" pitchFamily="34" charset="0"/>
-              </a:rPr>
-              <a:t>Justification: The majority of cities are not provided. All we really need is State.</a:t>
-            </a:r>
-          </a:p>
-          <a:p>
-            <a:r>
-              <a:rPr lang="en-US" sz="3600" dirty="0">
-                <a:latin typeface="Calibri" panose="020F0502020204030204" pitchFamily="34" charset="0"/>
-                <a:cs typeface="Calibri" panose="020F0502020204030204" pitchFamily="34" charset="0"/>
-              </a:rPr>
-              <a:t>Column name: State</a:t>
-            </a:r>
-          </a:p>
-          <a:p>
-            <a:pPr lvl="1"/>
-            <a:r>
-              <a:rPr lang="en-US" sz="3200" dirty="0">
-                <a:latin typeface="Calibri" panose="020F0502020204030204" pitchFamily="34" charset="0"/>
-                <a:cs typeface="Calibri" panose="020F0502020204030204" pitchFamily="34" charset="0"/>
-              </a:rPr>
-              <a:t>How resolved: Replace spaces with 'United States'</a:t>
-            </a:r>
-          </a:p>
-          <a:p>
-            <a:pPr lvl="1"/>
-            <a:r>
-              <a:rPr lang="en-US" sz="3200" dirty="0">
-                <a:latin typeface="Calibri" panose="020F0502020204030204" pitchFamily="34" charset="0"/>
-                <a:cs typeface="Calibri" panose="020F0502020204030204" pitchFamily="34" charset="0"/>
-              </a:rPr>
-              <a:t>Justification: Since this value was not provided in the file, the assumption is that the breach was national.</a:t>
-            </a:r>
-          </a:p>
-          <a:p>
-            <a:r>
-              <a:rPr lang="en-US" sz="3600" dirty="0">
-                <a:latin typeface="Calibri" panose="020F0502020204030204" pitchFamily="34" charset="0"/>
-                <a:cs typeface="Calibri" panose="020F0502020204030204" pitchFamily="34" charset="0"/>
-              </a:rPr>
-              <a:t>Column name: </a:t>
-            </a:r>
-            <a:r>
-              <a:rPr lang="en-US" sz="3600" dirty="0" smtClean="0">
-                <a:latin typeface="Calibri" panose="020F0502020204030204" pitchFamily="34" charset="0"/>
-                <a:cs typeface="Calibri" panose="020F0502020204030204" pitchFamily="34" charset="0"/>
-              </a:rPr>
-              <a:t>Total Records </a:t>
-            </a:r>
-            <a:endParaRPr lang="en-US" sz="3600" dirty="0">
+              <a:rPr lang="en-US" sz="4000" dirty="0" smtClean="0">
+                <a:latin typeface="Calibri" panose="020F0502020204030204" pitchFamily="34" charset="0"/>
+                <a:cs typeface="Calibri" panose="020F0502020204030204" pitchFamily="34" charset="0"/>
+              </a:rPr>
+              <a:t>Created new columns with assigned numerical values so that these would be picked up by histograms and correlations.  Added _CAT to column names.</a:t>
+            </a:r>
+            <a:endParaRPr lang="en-US" sz="4000" dirty="0">
               <a:latin typeface="Calibri" panose="020F0502020204030204" pitchFamily="34" charset="0"/>
               <a:cs typeface="Calibri" panose="020F0502020204030204" pitchFamily="34" charset="0"/>
             </a:endParaRPr>
@@ -4932,82 +4860,13 @@
           <a:p>
             <a:pPr lvl="1"/>
             <a:r>
-              <a:rPr lang="en-US" sz="3200" dirty="0">
-                <a:latin typeface="Calibri" panose="020F0502020204030204" pitchFamily="34" charset="0"/>
-                <a:cs typeface="Calibri" panose="020F0502020204030204" pitchFamily="34" charset="0"/>
-              </a:rPr>
-              <a:t>How resolved: Move zeros to null values. Then convert to float to remove zeros, then convert to int.</a:t>
-            </a:r>
-          </a:p>
-          <a:p>
-            <a:pPr lvl="1"/>
-            <a:r>
-              <a:rPr lang="en-US" sz="3200" dirty="0">
-                <a:latin typeface="Calibri" panose="020F0502020204030204" pitchFamily="34" charset="0"/>
-                <a:cs typeface="Calibri" panose="020F0502020204030204" pitchFamily="34" charset="0"/>
-              </a:rPr>
-              <a:t>Justification: This will enable the ability to measure the </a:t>
-            </a:r>
-            <a:r>
-              <a:rPr lang="en-US" sz="3200" dirty="0" smtClean="0">
-                <a:latin typeface="Calibri" panose="020F0502020204030204" pitchFamily="34" charset="0"/>
-                <a:cs typeface="Calibri" panose="020F0502020204030204" pitchFamily="34" charset="0"/>
-              </a:rPr>
-              <a:t>quantitative </a:t>
-            </a:r>
-            <a:r>
-              <a:rPr lang="en-US" sz="3200" dirty="0">
-                <a:latin typeface="Calibri" panose="020F0502020204030204" pitchFamily="34" charset="0"/>
-                <a:cs typeface="Calibri" panose="020F0502020204030204" pitchFamily="34" charset="0"/>
-              </a:rPr>
-              <a:t>impact.</a:t>
-            </a:r>
-          </a:p>
-          <a:p>
-            <a:r>
-              <a:rPr lang="en-US" sz="3600" dirty="0">
-                <a:latin typeface="Calibri" panose="020F0502020204030204" pitchFamily="34" charset="0"/>
-                <a:cs typeface="Calibri" panose="020F0502020204030204" pitchFamily="34" charset="0"/>
-              </a:rPr>
-              <a:t>Column name: Description </a:t>
-            </a:r>
-          </a:p>
-          <a:p>
-            <a:pPr lvl="1"/>
-            <a:r>
-              <a:rPr lang="en-US" sz="3200" dirty="0">
-                <a:latin typeface="Calibri" panose="020F0502020204030204" pitchFamily="34" charset="0"/>
-                <a:cs typeface="Calibri" panose="020F0502020204030204" pitchFamily="34" charset="0"/>
-              </a:rPr>
-              <a:t>How resolved: Replace spaces with 'None'</a:t>
-            </a:r>
-          </a:p>
-          <a:p>
-            <a:pPr lvl="1"/>
-            <a:r>
-              <a:rPr lang="en-US" sz="3200" dirty="0">
-                <a:latin typeface="Calibri" panose="020F0502020204030204" pitchFamily="34" charset="0"/>
-                <a:cs typeface="Calibri" panose="020F0502020204030204" pitchFamily="34" charset="0"/>
-              </a:rPr>
-              <a:t>Justification: This value was not provided in the file.</a:t>
-            </a:r>
-          </a:p>
-          <a:p>
-            <a:r>
-              <a:rPr lang="en-US" sz="3600" dirty="0">
-                <a:latin typeface="Calibri" panose="020F0502020204030204" pitchFamily="34" charset="0"/>
-                <a:cs typeface="Calibri" panose="020F0502020204030204" pitchFamily="34" charset="0"/>
-              </a:rPr>
-              <a:t>Column name: </a:t>
-            </a:r>
-            <a:r>
-              <a:rPr lang="en-US" sz="3600" dirty="0" smtClean="0">
-                <a:latin typeface="Calibri" panose="020F0502020204030204" pitchFamily="34" charset="0"/>
-                <a:cs typeface="Calibri" panose="020F0502020204030204" pitchFamily="34" charset="0"/>
-              </a:rPr>
-              <a:t>Breach Year</a:t>
-            </a:r>
-            <a:endParaRPr lang="en-US" sz="3600" dirty="0">
+              <a:rPr lang="en-US" sz="4000" dirty="0" smtClean="0">
+                <a:latin typeface="Calibri" panose="020F0502020204030204" pitchFamily="34" charset="0"/>
+                <a:cs typeface="Calibri" panose="020F0502020204030204" pitchFamily="34" charset="0"/>
+              </a:rPr>
+              <a:t>Breach Type </a:t>
+            </a:r>
+            <a:endParaRPr lang="en-US" sz="4000" dirty="0">
               <a:latin typeface="Calibri" panose="020F0502020204030204" pitchFamily="34" charset="0"/>
               <a:cs typeface="Calibri" panose="020F0502020204030204" pitchFamily="34" charset="0"/>
             </a:endParaRPr>
@@ -5015,58 +4874,97 @@
           <a:p>
             <a:pPr lvl="1"/>
             <a:r>
-              <a:rPr lang="en-US" sz="3200" dirty="0">
-                <a:latin typeface="Calibri" panose="020F0502020204030204" pitchFamily="34" charset="0"/>
-                <a:cs typeface="Calibri" panose="020F0502020204030204" pitchFamily="34" charset="0"/>
-              </a:rPr>
-              <a:t>How resolved: Drop column</a:t>
+              <a:rPr lang="en-US" sz="4000" dirty="0" smtClean="0">
+                <a:latin typeface="Calibri" panose="020F0502020204030204" pitchFamily="34" charset="0"/>
+                <a:cs typeface="Calibri" panose="020F0502020204030204" pitchFamily="34" charset="0"/>
+              </a:rPr>
+              <a:t>Organization Type</a:t>
             </a:r>
           </a:p>
           <a:p>
             <a:pPr lvl="1"/>
             <a:r>
-              <a:rPr lang="en-US" sz="3200" dirty="0">
-                <a:latin typeface="Calibri" panose="020F0502020204030204" pitchFamily="34" charset="0"/>
-                <a:cs typeface="Calibri" panose="020F0502020204030204" pitchFamily="34" charset="0"/>
-              </a:rPr>
-              <a:t>Justification: We have date with year with no empty values so do not need this field</a:t>
-            </a:r>
-          </a:p>
-          <a:p>
-            <a:r>
-              <a:rPr lang="en-US" sz="3600" dirty="0" smtClean="0">
-                <a:latin typeface="Calibri" panose="020F0502020204030204" pitchFamily="34" charset="0"/>
-                <a:cs typeface="Calibri" panose="020F0502020204030204" pitchFamily="34" charset="0"/>
-              </a:rPr>
-              <a:t>Dropped the following columns as </a:t>
-            </a:r>
-            <a:r>
-              <a:rPr lang="en-US" sz="3600" dirty="0">
-                <a:latin typeface="Calibri" panose="020F0502020204030204" pitchFamily="34" charset="0"/>
-                <a:cs typeface="Calibri" panose="020F0502020204030204" pitchFamily="34" charset="0"/>
-              </a:rPr>
-              <a:t>they are not needed:</a:t>
-            </a:r>
-          </a:p>
-          <a:p>
-            <a:pPr lvl="1"/>
-            <a:r>
-              <a:rPr lang="en-US" sz="3200" dirty="0">
-                <a:latin typeface="Calibri" panose="020F0502020204030204" pitchFamily="34" charset="0"/>
-                <a:cs typeface="Calibri" panose="020F0502020204030204" pitchFamily="34" charset="0"/>
-              </a:rPr>
-              <a:t>Information Source </a:t>
-            </a:r>
-          </a:p>
-          <a:p>
-            <a:pPr lvl="1"/>
-            <a:r>
-              <a:rPr lang="en-US" sz="3200" dirty="0">
-                <a:latin typeface="Calibri" panose="020F0502020204030204" pitchFamily="34" charset="0"/>
-                <a:cs typeface="Calibri" panose="020F0502020204030204" pitchFamily="34" charset="0"/>
-              </a:rPr>
-              <a:t>Source URL </a:t>
-            </a:r>
+              <a:rPr lang="en-US" sz="4000" dirty="0" smtClean="0">
+                <a:latin typeface="Calibri" panose="020F0502020204030204" pitchFamily="34" charset="0"/>
+                <a:cs typeface="Calibri" panose="020F0502020204030204" pitchFamily="34" charset="0"/>
+              </a:rPr>
+              <a:t>State</a:t>
+            </a:r>
+          </a:p>
+          <a:p>
+            <a:r>
+              <a:rPr lang="en-US" sz="4000" dirty="0" smtClean="0">
+                <a:latin typeface="Calibri" panose="020F0502020204030204" pitchFamily="34" charset="0"/>
+                <a:cs typeface="Calibri" panose="020F0502020204030204" pitchFamily="34" charset="0"/>
+              </a:rPr>
+              <a:t>Converted values of all numerical columns to integers</a:t>
+            </a:r>
+            <a:endParaRPr lang="en-US" sz="4000" dirty="0">
+              <a:latin typeface="Calibri" panose="020F0502020204030204" pitchFamily="34" charset="0"/>
+              <a:cs typeface="Calibri" panose="020F0502020204030204" pitchFamily="34" charset="0"/>
+            </a:endParaRPr>
+          </a:p>
+          <a:p>
+            <a:r>
+              <a:rPr lang="en-US" sz="4000" dirty="0" smtClean="0">
+                <a:latin typeface="Calibri" panose="020F0502020204030204" pitchFamily="34" charset="0"/>
+                <a:cs typeface="Calibri" panose="020F0502020204030204" pitchFamily="34" charset="0"/>
+              </a:rPr>
+              <a:t>Removed all non-US states from file.  Total records reduced to 8177</a:t>
+            </a:r>
+          </a:p>
+          <a:p>
+            <a:r>
+              <a:rPr lang="en-US" sz="4000" dirty="0" smtClean="0">
+                <a:latin typeface="Calibri" panose="020F0502020204030204" pitchFamily="34" charset="0"/>
+                <a:cs typeface="Calibri" panose="020F0502020204030204" pitchFamily="34" charset="0"/>
+              </a:rPr>
+              <a:t>Renamed several columns</a:t>
+            </a:r>
+          </a:p>
+          <a:p>
+            <a:r>
+              <a:rPr lang="en-US" sz="4000" dirty="0" smtClean="0">
+                <a:latin typeface="Calibri" panose="020F0502020204030204" pitchFamily="34" charset="0"/>
+                <a:cs typeface="Calibri" panose="020F0502020204030204" pitchFamily="34" charset="0"/>
+              </a:rPr>
+              <a:t>Converted Date of Breach to Year only so now it becomes Breach Year replacing the one dropped. It had values in every record where the original one did not.</a:t>
+            </a:r>
+          </a:p>
+          <a:p>
+            <a:r>
+              <a:rPr lang="en-US" sz="4000" dirty="0" smtClean="0">
+                <a:latin typeface="Calibri" panose="020F0502020204030204" pitchFamily="34" charset="0"/>
+                <a:cs typeface="Calibri" panose="020F0502020204030204" pitchFamily="34" charset="0"/>
+              </a:rPr>
+              <a:t>Integrated GDP from another file for normalization</a:t>
+            </a:r>
+            <a:endParaRPr lang="en-US" sz="4000" dirty="0">
+              <a:latin typeface="Calibri" panose="020F0502020204030204" pitchFamily="34" charset="0"/>
+              <a:cs typeface="Calibri" panose="020F0502020204030204" pitchFamily="34" charset="0"/>
+            </a:endParaRPr>
+          </a:p>
+          <a:p>
+            <a:r>
+              <a:rPr lang="en-US" sz="4000" dirty="0" smtClean="0">
+                <a:latin typeface="Calibri" panose="020F0502020204030204" pitchFamily="34" charset="0"/>
+                <a:cs typeface="Calibri" panose="020F0502020204030204" pitchFamily="34" charset="0"/>
+              </a:rPr>
+              <a:t>Created new file for just longitude and latitude columns and removed them from the breach file.</a:t>
+            </a:r>
+          </a:p>
+          <a:p>
+            <a:r>
+              <a:rPr lang="en-US" sz="4000" dirty="0" smtClean="0">
+                <a:latin typeface="Calibri" panose="020F0502020204030204" pitchFamily="34" charset="0"/>
+                <a:cs typeface="Calibri" panose="020F0502020204030204" pitchFamily="34" charset="0"/>
+              </a:rPr>
+              <a:t>Wrote cleaned breach file.</a:t>
+            </a:r>
+            <a:endParaRPr lang="en-US" sz="4000" dirty="0">
+              <a:latin typeface="Calibri" panose="020F0502020204030204" pitchFamily="34" charset="0"/>
+              <a:cs typeface="Calibri" panose="020F0502020204030204" pitchFamily="34" charset="0"/>
+            </a:endParaRPr>
           </a:p>
           <a:p>
             <a:pPr marL="109728" indent="0" algn="ctr">
@@ -5083,6 +4981,2089 @@
     <p:extLst>
       <p:ext uri="{BB962C8B-B14F-4D97-AF65-F5344CB8AC3E}">
         <p14:creationId xmlns:p14="http://schemas.microsoft.com/office/powerpoint/2010/main" val="2557784618"/>
+      </p:ext>
+    </p:extLst>
+  </p:cSld>
+  <p:clrMapOvr>
+    <a:masterClrMapping/>
+  </p:clrMapOvr>
+</p:sld>
+</file>
+
+<file path=ppt/slides/slide11.xml><?xml version="1.0" encoding="utf-8"?>
+<p:sld xmlns:a="http://schemas.openxmlformats.org/drawingml/2006/main" xmlns:r="http://schemas.openxmlformats.org/officeDocument/2006/relationships" xmlns:p="http://schemas.openxmlformats.org/presentationml/2006/main">
+  <p:cSld>
+    <p:spTree>
+      <p:nvGrpSpPr>
+        <p:cNvPr id="1" name=""/>
+        <p:cNvGrpSpPr/>
+        <p:nvPr/>
+      </p:nvGrpSpPr>
+      <p:grpSpPr>
+        <a:xfrm>
+          <a:off x="0" y="0"/>
+          <a:ext cx="0" cy="0"/>
+          <a:chOff x="0" y="0"/>
+          <a:chExt cx="0" cy="0"/>
+        </a:xfrm>
+      </p:grpSpPr>
+      <p:sp>
+        <p:nvSpPr>
+          <p:cNvPr id="2" name="Content Placeholder 1"/>
+          <p:cNvSpPr>
+            <a:spLocks noGrp="1"/>
+          </p:cNvSpPr>
+          <p:nvPr>
+            <p:ph idx="1"/>
+          </p:nvPr>
+        </p:nvSpPr>
+        <p:spPr>
+          <a:xfrm>
+            <a:off x="457200" y="381000"/>
+            <a:ext cx="8229600" cy="6172200"/>
+          </a:xfrm>
+        </p:spPr>
+        <p:txBody>
+          <a:bodyPr>
+            <a:normAutofit/>
+          </a:bodyPr>
+          <a:lstStyle/>
+          <a:p>
+            <a:pPr marL="109728" indent="0" algn="ctr">
+              <a:buNone/>
+            </a:pPr>
+            <a:r>
+              <a:rPr lang="en-US" sz="2800" dirty="0">
+                <a:latin typeface="Calibri" panose="020F0502020204030204" pitchFamily="34" charset="0"/>
+                <a:cs typeface="Calibri" panose="020F0502020204030204" pitchFamily="34" charset="0"/>
+              </a:rPr>
+              <a:t>Exploratory Data </a:t>
+            </a:r>
+            <a:r>
+              <a:rPr lang="en-US" sz="2800" dirty="0" smtClean="0">
+                <a:latin typeface="Calibri" panose="020F0502020204030204" pitchFamily="34" charset="0"/>
+                <a:cs typeface="Calibri" panose="020F0502020204030204" pitchFamily="34" charset="0"/>
+              </a:rPr>
+              <a:t>Analysis </a:t>
+            </a:r>
+            <a:r>
+              <a:rPr lang="en-US" sz="2800" dirty="0">
+                <a:latin typeface="Calibri" panose="020F0502020204030204" pitchFamily="34" charset="0"/>
+                <a:cs typeface="Calibri" panose="020F0502020204030204" pitchFamily="34" charset="0"/>
+              </a:rPr>
+              <a:t>and Data </a:t>
+            </a:r>
+            <a:r>
+              <a:rPr lang="en-US" sz="2800" dirty="0" smtClean="0">
+                <a:latin typeface="Calibri" panose="020F0502020204030204" pitchFamily="34" charset="0"/>
+                <a:cs typeface="Calibri" panose="020F0502020204030204" pitchFamily="34" charset="0"/>
+              </a:rPr>
+              <a:t>Visualization</a:t>
+            </a:r>
+            <a:endParaRPr lang="en-US" sz="2800" dirty="0">
+              <a:latin typeface="Calibri" panose="020F0502020204030204" pitchFamily="34" charset="0"/>
+              <a:cs typeface="Calibri" panose="020F0502020204030204" pitchFamily="34" charset="0"/>
+            </a:endParaRPr>
+          </a:p>
+          <a:p>
+            <a:pPr marL="109728" indent="0" algn="ctr">
+              <a:buNone/>
+            </a:pPr>
+            <a:r>
+              <a:rPr lang="en-US" sz="2800" dirty="0">
+                <a:latin typeface="Calibri" panose="020F0502020204030204" pitchFamily="34" charset="0"/>
+                <a:cs typeface="Calibri" panose="020F0502020204030204" pitchFamily="34" charset="0"/>
+              </a:rPr>
+              <a:t>Basic </a:t>
+            </a:r>
+            <a:r>
+              <a:rPr lang="en-US" sz="2800" dirty="0" smtClean="0">
+                <a:latin typeface="Calibri" panose="020F0502020204030204" pitchFamily="34" charset="0"/>
+                <a:cs typeface="Calibri" panose="020F0502020204030204" pitchFamily="34" charset="0"/>
+              </a:rPr>
+              <a:t>Statistics </a:t>
+            </a:r>
+            <a:r>
+              <a:rPr lang="en-US" sz="2800" dirty="0">
+                <a:latin typeface="Calibri" panose="020F0502020204030204" pitchFamily="34" charset="0"/>
+                <a:cs typeface="Calibri" panose="020F0502020204030204" pitchFamily="34" charset="0"/>
+              </a:rPr>
+              <a:t>and </a:t>
+            </a:r>
+            <a:r>
+              <a:rPr lang="en-US" sz="2800" dirty="0" smtClean="0">
+                <a:latin typeface="Calibri" panose="020F0502020204030204" pitchFamily="34" charset="0"/>
+                <a:cs typeface="Calibri" panose="020F0502020204030204" pitchFamily="34" charset="0"/>
+              </a:rPr>
+              <a:t>Visualization</a:t>
+            </a:r>
+          </a:p>
+          <a:p>
+            <a:pPr marL="109728" indent="0">
+              <a:buNone/>
+            </a:pPr>
+            <a:r>
+              <a:rPr lang="en-US" sz="2800" dirty="0" smtClean="0">
+                <a:latin typeface="Calibri" panose="020F0502020204030204" pitchFamily="34" charset="0"/>
+                <a:cs typeface="Calibri" panose="020F0502020204030204" pitchFamily="34" charset="0"/>
+              </a:rPr>
+              <a:t>‘Describe’ for columns with object types will provide statistical results as follows: </a:t>
+            </a:r>
+          </a:p>
+          <a:p>
+            <a:pPr marL="109728" indent="0">
+              <a:buNone/>
+            </a:pPr>
+            <a:r>
+              <a:rPr lang="en-US" sz="2800" dirty="0" smtClean="0">
+                <a:latin typeface="Calibri" panose="020F0502020204030204" pitchFamily="34" charset="0"/>
+                <a:cs typeface="Calibri" panose="020F0502020204030204" pitchFamily="34" charset="0"/>
+              </a:rPr>
+              <a:t>Breach Year:</a:t>
+            </a:r>
+          </a:p>
+          <a:p>
+            <a:pPr marL="109728" indent="0">
+              <a:buNone/>
+            </a:pPr>
+            <a:r>
+              <a:rPr lang="en-US" sz="2800" dirty="0">
+                <a:latin typeface="Calibri" panose="020F0502020204030204" pitchFamily="34" charset="0"/>
+                <a:cs typeface="Calibri" panose="020F0502020204030204" pitchFamily="34" charset="0"/>
+              </a:rPr>
+              <a:t>count </a:t>
+            </a:r>
+            <a:r>
+              <a:rPr lang="en-US" sz="2800" dirty="0" smtClean="0">
+                <a:latin typeface="Calibri" panose="020F0502020204030204" pitchFamily="34" charset="0"/>
+                <a:cs typeface="Calibri" panose="020F0502020204030204" pitchFamily="34" charset="0"/>
+              </a:rPr>
+              <a:t>	8177 </a:t>
+            </a:r>
+          </a:p>
+          <a:p>
+            <a:pPr marL="109728" indent="0">
+              <a:buNone/>
+            </a:pPr>
+            <a:r>
+              <a:rPr lang="en-US" sz="2800" dirty="0" smtClean="0">
+                <a:latin typeface="Calibri" panose="020F0502020204030204" pitchFamily="34" charset="0"/>
+                <a:cs typeface="Calibri" panose="020F0502020204030204" pitchFamily="34" charset="0"/>
+              </a:rPr>
+              <a:t>unique 	    14 </a:t>
+            </a:r>
+          </a:p>
+          <a:p>
+            <a:pPr marL="109728" indent="0">
+              <a:buNone/>
+            </a:pPr>
+            <a:r>
+              <a:rPr lang="en-US" sz="2800" dirty="0" smtClean="0">
+                <a:latin typeface="Calibri" panose="020F0502020204030204" pitchFamily="34" charset="0"/>
+                <a:cs typeface="Calibri" panose="020F0502020204030204" pitchFamily="34" charset="0"/>
+              </a:rPr>
+              <a:t>Top		2014 </a:t>
+            </a:r>
+          </a:p>
+          <a:p>
+            <a:pPr marL="109728" indent="0">
+              <a:buNone/>
+            </a:pPr>
+            <a:r>
+              <a:rPr lang="en-US" sz="2800" dirty="0" smtClean="0">
+                <a:latin typeface="Calibri" panose="020F0502020204030204" pitchFamily="34" charset="0"/>
+                <a:cs typeface="Calibri" panose="020F0502020204030204" pitchFamily="34" charset="0"/>
+              </a:rPr>
+              <a:t>freq 	  	887 </a:t>
+            </a:r>
+          </a:p>
+          <a:p>
+            <a:pPr marL="109728" indent="0">
+              <a:buNone/>
+            </a:pPr>
+            <a:r>
+              <a:rPr lang="en-US" sz="2800" dirty="0" smtClean="0">
+                <a:latin typeface="Calibri" panose="020F0502020204030204" pitchFamily="34" charset="0"/>
+                <a:cs typeface="Calibri" panose="020F0502020204030204" pitchFamily="34" charset="0"/>
+              </a:rPr>
+              <a:t>The largest number of breaches occurred in 2014. </a:t>
+            </a:r>
+          </a:p>
+          <a:p>
+            <a:pPr marL="109728" indent="0">
+              <a:buNone/>
+            </a:pPr>
+            <a:r>
+              <a:rPr lang="en-US" sz="2800" dirty="0" smtClean="0">
+                <a:latin typeface="Calibri" panose="020F0502020204030204" pitchFamily="34" charset="0"/>
+                <a:cs typeface="Calibri" panose="020F0502020204030204" pitchFamily="34" charset="0"/>
+              </a:rPr>
+              <a:t>There are 14 years</a:t>
+            </a:r>
+          </a:p>
+          <a:p>
+            <a:pPr marL="109728" indent="0">
+              <a:buNone/>
+            </a:pPr>
+            <a:r>
+              <a:rPr lang="en-US" sz="2800" dirty="0" smtClean="0">
+                <a:latin typeface="Calibri" panose="020F0502020204030204" pitchFamily="34" charset="0"/>
+                <a:cs typeface="Calibri" panose="020F0502020204030204" pitchFamily="34" charset="0"/>
+              </a:rPr>
+              <a:t>Total record count is 8,177</a:t>
+            </a:r>
+          </a:p>
+        </p:txBody>
+      </p:sp>
+    </p:spTree>
+    <p:extLst>
+      <p:ext uri="{BB962C8B-B14F-4D97-AF65-F5344CB8AC3E}">
+        <p14:creationId xmlns:p14="http://schemas.microsoft.com/office/powerpoint/2010/main" val="2288347669"/>
+      </p:ext>
+    </p:extLst>
+  </p:cSld>
+  <p:clrMapOvr>
+    <a:masterClrMapping/>
+  </p:clrMapOvr>
+</p:sld>
+</file>
+
+<file path=ppt/slides/slide12.xml><?xml version="1.0" encoding="utf-8"?>
+<p:sld xmlns:a="http://schemas.openxmlformats.org/drawingml/2006/main" xmlns:r="http://schemas.openxmlformats.org/officeDocument/2006/relationships" xmlns:p="http://schemas.openxmlformats.org/presentationml/2006/main">
+  <p:cSld>
+    <p:spTree>
+      <p:nvGrpSpPr>
+        <p:cNvPr id="1" name=""/>
+        <p:cNvGrpSpPr/>
+        <p:nvPr/>
+      </p:nvGrpSpPr>
+      <p:grpSpPr>
+        <a:xfrm>
+          <a:off x="0" y="0"/>
+          <a:ext cx="0" cy="0"/>
+          <a:chOff x="0" y="0"/>
+          <a:chExt cx="0" cy="0"/>
+        </a:xfrm>
+      </p:grpSpPr>
+      <p:sp>
+        <p:nvSpPr>
+          <p:cNvPr id="2" name="Content Placeholder 1"/>
+          <p:cNvSpPr>
+            <a:spLocks noGrp="1"/>
+          </p:cNvSpPr>
+          <p:nvPr>
+            <p:ph idx="1"/>
+          </p:nvPr>
+        </p:nvSpPr>
+        <p:spPr>
+          <a:xfrm>
+            <a:off x="457200" y="381000"/>
+            <a:ext cx="8229600" cy="6172200"/>
+          </a:xfrm>
+        </p:spPr>
+        <p:txBody>
+          <a:bodyPr>
+            <a:normAutofit/>
+          </a:bodyPr>
+          <a:lstStyle/>
+          <a:p>
+            <a:pPr marL="109728" indent="0" algn="ctr">
+              <a:buNone/>
+            </a:pPr>
+            <a:r>
+              <a:rPr lang="en-US" sz="2800" dirty="0">
+                <a:latin typeface="Calibri" panose="020F0502020204030204" pitchFamily="34" charset="0"/>
+                <a:cs typeface="Calibri" panose="020F0502020204030204" pitchFamily="34" charset="0"/>
+              </a:rPr>
+              <a:t>Exploratory Data </a:t>
+            </a:r>
+            <a:r>
+              <a:rPr lang="en-US" sz="2800" dirty="0" smtClean="0">
+                <a:latin typeface="Calibri" panose="020F0502020204030204" pitchFamily="34" charset="0"/>
+                <a:cs typeface="Calibri" panose="020F0502020204030204" pitchFamily="34" charset="0"/>
+              </a:rPr>
+              <a:t>Analysis </a:t>
+            </a:r>
+            <a:r>
+              <a:rPr lang="en-US" sz="2800" dirty="0">
+                <a:latin typeface="Calibri" panose="020F0502020204030204" pitchFamily="34" charset="0"/>
+                <a:cs typeface="Calibri" panose="020F0502020204030204" pitchFamily="34" charset="0"/>
+              </a:rPr>
+              <a:t>and Data </a:t>
+            </a:r>
+            <a:r>
+              <a:rPr lang="en-US" sz="2800" dirty="0" smtClean="0">
+                <a:latin typeface="Calibri" panose="020F0502020204030204" pitchFamily="34" charset="0"/>
+                <a:cs typeface="Calibri" panose="020F0502020204030204" pitchFamily="34" charset="0"/>
+              </a:rPr>
+              <a:t>Visualization</a:t>
+            </a:r>
+            <a:endParaRPr lang="en-US" sz="2800" dirty="0">
+              <a:latin typeface="Calibri" panose="020F0502020204030204" pitchFamily="34" charset="0"/>
+              <a:cs typeface="Calibri" panose="020F0502020204030204" pitchFamily="34" charset="0"/>
+            </a:endParaRPr>
+          </a:p>
+          <a:p>
+            <a:pPr marL="109728" indent="0" algn="ctr">
+              <a:buNone/>
+            </a:pPr>
+            <a:r>
+              <a:rPr lang="en-US" sz="2800" dirty="0">
+                <a:latin typeface="Calibri" panose="020F0502020204030204" pitchFamily="34" charset="0"/>
+                <a:cs typeface="Calibri" panose="020F0502020204030204" pitchFamily="34" charset="0"/>
+              </a:rPr>
+              <a:t>Basic </a:t>
+            </a:r>
+            <a:r>
+              <a:rPr lang="en-US" sz="2800" dirty="0" smtClean="0">
+                <a:latin typeface="Calibri" panose="020F0502020204030204" pitchFamily="34" charset="0"/>
+                <a:cs typeface="Calibri" panose="020F0502020204030204" pitchFamily="34" charset="0"/>
+              </a:rPr>
+              <a:t>Statistics </a:t>
+            </a:r>
+            <a:r>
+              <a:rPr lang="en-US" sz="2800" dirty="0">
+                <a:latin typeface="Calibri" panose="020F0502020204030204" pitchFamily="34" charset="0"/>
+                <a:cs typeface="Calibri" panose="020F0502020204030204" pitchFamily="34" charset="0"/>
+              </a:rPr>
+              <a:t>and </a:t>
+            </a:r>
+            <a:r>
+              <a:rPr lang="en-US" sz="2800" dirty="0" smtClean="0">
+                <a:latin typeface="Calibri" panose="020F0502020204030204" pitchFamily="34" charset="0"/>
+                <a:cs typeface="Calibri" panose="020F0502020204030204" pitchFamily="34" charset="0"/>
+              </a:rPr>
+              <a:t>Visualization</a:t>
+            </a:r>
+          </a:p>
+          <a:p>
+            <a:pPr marL="109728" indent="0">
+              <a:buNone/>
+            </a:pPr>
+            <a:endParaRPr lang="en-US" sz="2800" dirty="0" smtClean="0">
+              <a:latin typeface="Calibri" panose="020F0502020204030204" pitchFamily="34" charset="0"/>
+              <a:cs typeface="Calibri" panose="020F0502020204030204" pitchFamily="34" charset="0"/>
+            </a:endParaRPr>
+          </a:p>
+          <a:p>
+            <a:pPr marL="109728" indent="0">
+              <a:buNone/>
+            </a:pPr>
+            <a:r>
+              <a:rPr lang="en-US" sz="2800" dirty="0" smtClean="0">
+                <a:latin typeface="Calibri" panose="020F0502020204030204" pitchFamily="34" charset="0"/>
+                <a:cs typeface="Calibri" panose="020F0502020204030204" pitchFamily="34" charset="0"/>
+              </a:rPr>
+              <a:t>In order to answer business questions, need certain statistics:</a:t>
+            </a:r>
+          </a:p>
+          <a:p>
+            <a:r>
+              <a:rPr lang="en-US" sz="2800" dirty="0" smtClean="0">
+                <a:latin typeface="Calibri" panose="020F0502020204030204" pitchFamily="34" charset="0"/>
+                <a:cs typeface="Calibri" panose="020F0502020204030204" pitchFamily="34" charset="0"/>
+              </a:rPr>
+              <a:t>To get counts:  Statistical commands such </a:t>
+            </a:r>
+            <a:r>
+              <a:rPr lang="en-US" sz="2800" dirty="0">
+                <a:latin typeface="Calibri" panose="020F0502020204030204" pitchFamily="34" charset="0"/>
+                <a:cs typeface="Calibri" panose="020F0502020204030204" pitchFamily="34" charset="0"/>
+              </a:rPr>
+              <a:t>as ‘</a:t>
+            </a:r>
+            <a:r>
+              <a:rPr lang="en-US" sz="2800" dirty="0" err="1">
+                <a:latin typeface="Calibri" panose="020F0502020204030204" pitchFamily="34" charset="0"/>
+                <a:cs typeface="Calibri" panose="020F0502020204030204" pitchFamily="34" charset="0"/>
+              </a:rPr>
+              <a:t>df.groupby</a:t>
+            </a:r>
+            <a:r>
+              <a:rPr lang="en-US" sz="2800" dirty="0">
+                <a:latin typeface="Calibri" panose="020F0502020204030204" pitchFamily="34" charset="0"/>
+                <a:cs typeface="Calibri" panose="020F0502020204030204" pitchFamily="34" charset="0"/>
+              </a:rPr>
+              <a:t>(['</a:t>
+            </a:r>
+            <a:r>
+              <a:rPr lang="en-US" sz="2800" dirty="0" err="1">
+                <a:latin typeface="Calibri" panose="020F0502020204030204" pitchFamily="34" charset="0"/>
+                <a:cs typeface="Calibri" panose="020F0502020204030204" pitchFamily="34" charset="0"/>
+              </a:rPr>
+              <a:t>Breach_Year</a:t>
+            </a:r>
+            <a:r>
+              <a:rPr lang="en-US" sz="2800" dirty="0">
+                <a:latin typeface="Calibri" panose="020F0502020204030204" pitchFamily="34" charset="0"/>
+                <a:cs typeface="Calibri" panose="020F0502020204030204" pitchFamily="34" charset="0"/>
+              </a:rPr>
+              <a:t>']).size</a:t>
+            </a:r>
+            <a:r>
+              <a:rPr lang="en-US" sz="2800" dirty="0" smtClean="0">
+                <a:latin typeface="Calibri" panose="020F0502020204030204" pitchFamily="34" charset="0"/>
+                <a:cs typeface="Calibri" panose="020F0502020204030204" pitchFamily="34" charset="0"/>
+              </a:rPr>
+              <a:t>()’ will provide counts for each group within a column. </a:t>
+            </a:r>
+          </a:p>
+          <a:p>
+            <a:r>
+              <a:rPr lang="en-US" sz="2800" dirty="0" smtClean="0">
+                <a:latin typeface="Calibri" panose="020F0502020204030204" pitchFamily="34" charset="0"/>
+                <a:cs typeface="Calibri" panose="020F0502020204030204" pitchFamily="34" charset="0"/>
+              </a:rPr>
+              <a:t>Did this for Breach Type, Organization Type and State.</a:t>
+            </a:r>
+          </a:p>
+          <a:p>
+            <a:r>
+              <a:rPr lang="en-US" sz="2800" dirty="0" smtClean="0">
+                <a:latin typeface="Calibri" panose="020F0502020204030204" pitchFamily="34" charset="0"/>
+                <a:cs typeface="Calibri" panose="020F0502020204030204" pitchFamily="34" charset="0"/>
+              </a:rPr>
+              <a:t>Created Histograms for each numerical column</a:t>
+            </a:r>
+          </a:p>
+          <a:p>
+            <a:pPr marL="109728" indent="0">
+              <a:buNone/>
+            </a:pPr>
+            <a:r>
+              <a:rPr lang="en-US" sz="2800" dirty="0" smtClean="0">
+                <a:latin typeface="Calibri" panose="020F0502020204030204" pitchFamily="34" charset="0"/>
+                <a:cs typeface="Calibri" panose="020F0502020204030204" pitchFamily="34" charset="0"/>
+              </a:rPr>
+              <a:t>	(histograms in next slide)</a:t>
+            </a:r>
+          </a:p>
+        </p:txBody>
+      </p:sp>
+    </p:spTree>
+    <p:extLst>
+      <p:ext uri="{BB962C8B-B14F-4D97-AF65-F5344CB8AC3E}">
+        <p14:creationId xmlns:p14="http://schemas.microsoft.com/office/powerpoint/2010/main" val="1128972384"/>
+      </p:ext>
+    </p:extLst>
+  </p:cSld>
+  <p:clrMapOvr>
+    <a:masterClrMapping/>
+  </p:clrMapOvr>
+</p:sld>
+</file>
+
+<file path=ppt/slides/slide13.xml><?xml version="1.0" encoding="utf-8"?>
+<p:sld xmlns:a="http://schemas.openxmlformats.org/drawingml/2006/main" xmlns:r="http://schemas.openxmlformats.org/officeDocument/2006/relationships" xmlns:p="http://schemas.openxmlformats.org/presentationml/2006/main">
+  <p:cSld>
+    <p:spTree>
+      <p:nvGrpSpPr>
+        <p:cNvPr id="1" name=""/>
+        <p:cNvGrpSpPr/>
+        <p:nvPr/>
+      </p:nvGrpSpPr>
+      <p:grpSpPr>
+        <a:xfrm>
+          <a:off x="0" y="0"/>
+          <a:ext cx="0" cy="0"/>
+          <a:chOff x="0" y="0"/>
+          <a:chExt cx="0" cy="0"/>
+        </a:xfrm>
+      </p:grpSpPr>
+      <p:sp>
+        <p:nvSpPr>
+          <p:cNvPr id="2" name="Content Placeholder 1"/>
+          <p:cNvSpPr>
+            <a:spLocks noGrp="1"/>
+          </p:cNvSpPr>
+          <p:nvPr>
+            <p:ph idx="1"/>
+          </p:nvPr>
+        </p:nvSpPr>
+        <p:spPr>
+          <a:xfrm>
+            <a:off x="457200" y="381000"/>
+            <a:ext cx="8229600" cy="6172200"/>
+          </a:xfrm>
+        </p:spPr>
+        <p:txBody>
+          <a:bodyPr>
+            <a:normAutofit/>
+          </a:bodyPr>
+          <a:lstStyle/>
+          <a:p>
+            <a:pPr marL="109728" indent="0" algn="ctr">
+              <a:buNone/>
+            </a:pPr>
+            <a:r>
+              <a:rPr lang="en-US" sz="2800" dirty="0">
+                <a:latin typeface="Calibri" panose="020F0502020204030204" pitchFamily="34" charset="0"/>
+                <a:cs typeface="Calibri" panose="020F0502020204030204" pitchFamily="34" charset="0"/>
+              </a:rPr>
+              <a:t>Exploratory Data </a:t>
+            </a:r>
+            <a:r>
+              <a:rPr lang="en-US" sz="2800" dirty="0" smtClean="0">
+                <a:latin typeface="Calibri" panose="020F0502020204030204" pitchFamily="34" charset="0"/>
+                <a:cs typeface="Calibri" panose="020F0502020204030204" pitchFamily="34" charset="0"/>
+              </a:rPr>
+              <a:t>Analysis </a:t>
+            </a:r>
+            <a:r>
+              <a:rPr lang="en-US" sz="2800" dirty="0">
+                <a:latin typeface="Calibri" panose="020F0502020204030204" pitchFamily="34" charset="0"/>
+                <a:cs typeface="Calibri" panose="020F0502020204030204" pitchFamily="34" charset="0"/>
+              </a:rPr>
+              <a:t>and Data </a:t>
+            </a:r>
+            <a:r>
+              <a:rPr lang="en-US" sz="2800" dirty="0" smtClean="0">
+                <a:latin typeface="Calibri" panose="020F0502020204030204" pitchFamily="34" charset="0"/>
+                <a:cs typeface="Calibri" panose="020F0502020204030204" pitchFamily="34" charset="0"/>
+              </a:rPr>
+              <a:t>Visualization</a:t>
+            </a:r>
+            <a:endParaRPr lang="en-US" sz="2800" dirty="0">
+              <a:latin typeface="Calibri" panose="020F0502020204030204" pitchFamily="34" charset="0"/>
+              <a:cs typeface="Calibri" panose="020F0502020204030204" pitchFamily="34" charset="0"/>
+            </a:endParaRPr>
+          </a:p>
+          <a:p>
+            <a:pPr marL="109728" indent="0" algn="ctr">
+              <a:buNone/>
+            </a:pPr>
+            <a:r>
+              <a:rPr lang="en-US" sz="2800" dirty="0">
+                <a:latin typeface="Calibri" panose="020F0502020204030204" pitchFamily="34" charset="0"/>
+                <a:cs typeface="Calibri" panose="020F0502020204030204" pitchFamily="34" charset="0"/>
+              </a:rPr>
+              <a:t>Basic </a:t>
+            </a:r>
+            <a:r>
+              <a:rPr lang="en-US" sz="2800" dirty="0" smtClean="0">
+                <a:latin typeface="Calibri" panose="020F0502020204030204" pitchFamily="34" charset="0"/>
+                <a:cs typeface="Calibri" panose="020F0502020204030204" pitchFamily="34" charset="0"/>
+              </a:rPr>
+              <a:t>Statistics </a:t>
+            </a:r>
+            <a:r>
+              <a:rPr lang="en-US" sz="2800" dirty="0">
+                <a:latin typeface="Calibri" panose="020F0502020204030204" pitchFamily="34" charset="0"/>
+                <a:cs typeface="Calibri" panose="020F0502020204030204" pitchFamily="34" charset="0"/>
+              </a:rPr>
+              <a:t>and </a:t>
+            </a:r>
+            <a:r>
+              <a:rPr lang="en-US" sz="2800" dirty="0" smtClean="0">
+                <a:latin typeface="Calibri" panose="020F0502020204030204" pitchFamily="34" charset="0"/>
+                <a:cs typeface="Calibri" panose="020F0502020204030204" pitchFamily="34" charset="0"/>
+              </a:rPr>
+              <a:t>Visualization</a:t>
+            </a:r>
+          </a:p>
+          <a:p>
+            <a:pPr marL="109728" indent="0">
+              <a:buNone/>
+            </a:pPr>
+            <a:endParaRPr lang="en-US" sz="2800" dirty="0" smtClean="0">
+              <a:latin typeface="Calibri" panose="020F0502020204030204" pitchFamily="34" charset="0"/>
+              <a:cs typeface="Calibri" panose="020F0502020204030204" pitchFamily="34" charset="0"/>
+            </a:endParaRPr>
+          </a:p>
+        </p:txBody>
+      </p:sp>
+      <p:pic>
+        <p:nvPicPr>
+          <p:cNvPr id="3" name="Picture 2"/>
+          <p:cNvPicPr>
+            <a:picLocks noChangeAspect="1"/>
+          </p:cNvPicPr>
+          <p:nvPr/>
+        </p:nvPicPr>
+        <p:blipFill>
+          <a:blip r:embed="rId2">
+            <a:extLst>
+              <a:ext uri="{28A0092B-C50C-407E-A947-70E740481C1C}">
+                <a14:useLocalDpi xmlns:a14="http://schemas.microsoft.com/office/drawing/2010/main" val="0"/>
+              </a:ext>
+            </a:extLst>
+          </a:blip>
+          <a:stretch>
+            <a:fillRect/>
+          </a:stretch>
+        </p:blipFill>
+        <p:spPr>
+          <a:xfrm>
+            <a:off x="1066800" y="1314825"/>
+            <a:ext cx="7467600" cy="5563957"/>
+          </a:xfrm>
+          <a:prstGeom prst="rect">
+            <a:avLst/>
+          </a:prstGeom>
+        </p:spPr>
+      </p:pic>
+    </p:spTree>
+    <p:extLst>
+      <p:ext uri="{BB962C8B-B14F-4D97-AF65-F5344CB8AC3E}">
+        <p14:creationId xmlns:p14="http://schemas.microsoft.com/office/powerpoint/2010/main" val="1613955010"/>
+      </p:ext>
+    </p:extLst>
+  </p:cSld>
+  <p:clrMapOvr>
+    <a:masterClrMapping/>
+  </p:clrMapOvr>
+</p:sld>
+</file>
+
+<file path=ppt/slides/slide14.xml><?xml version="1.0" encoding="utf-8"?>
+<p:sld xmlns:a="http://schemas.openxmlformats.org/drawingml/2006/main" xmlns:r="http://schemas.openxmlformats.org/officeDocument/2006/relationships" xmlns:p="http://schemas.openxmlformats.org/presentationml/2006/main">
+  <p:cSld>
+    <p:spTree>
+      <p:nvGrpSpPr>
+        <p:cNvPr id="1" name=""/>
+        <p:cNvGrpSpPr/>
+        <p:nvPr/>
+      </p:nvGrpSpPr>
+      <p:grpSpPr>
+        <a:xfrm>
+          <a:off x="0" y="0"/>
+          <a:ext cx="0" cy="0"/>
+          <a:chOff x="0" y="0"/>
+          <a:chExt cx="0" cy="0"/>
+        </a:xfrm>
+      </p:grpSpPr>
+      <p:sp>
+        <p:nvSpPr>
+          <p:cNvPr id="2" name="Content Placeholder 1"/>
+          <p:cNvSpPr>
+            <a:spLocks noGrp="1"/>
+          </p:cNvSpPr>
+          <p:nvPr>
+            <p:ph idx="1"/>
+          </p:nvPr>
+        </p:nvSpPr>
+        <p:spPr>
+          <a:xfrm>
+            <a:off x="457200" y="381000"/>
+            <a:ext cx="8229600" cy="6172200"/>
+          </a:xfrm>
+        </p:spPr>
+        <p:txBody>
+          <a:bodyPr>
+            <a:normAutofit/>
+          </a:bodyPr>
+          <a:lstStyle/>
+          <a:p>
+            <a:pPr marL="109728" indent="0" algn="ctr">
+              <a:buNone/>
+            </a:pPr>
+            <a:r>
+              <a:rPr lang="en-US" sz="2800" dirty="0">
+                <a:latin typeface="Calibri" panose="020F0502020204030204" pitchFamily="34" charset="0"/>
+                <a:cs typeface="Calibri" panose="020F0502020204030204" pitchFamily="34" charset="0"/>
+              </a:rPr>
+              <a:t>Exploratory Data </a:t>
+            </a:r>
+            <a:r>
+              <a:rPr lang="en-US" sz="2800" dirty="0" smtClean="0">
+                <a:latin typeface="Calibri" panose="020F0502020204030204" pitchFamily="34" charset="0"/>
+                <a:cs typeface="Calibri" panose="020F0502020204030204" pitchFamily="34" charset="0"/>
+              </a:rPr>
+              <a:t>Analysis </a:t>
+            </a:r>
+            <a:r>
+              <a:rPr lang="en-US" sz="2800" dirty="0">
+                <a:latin typeface="Calibri" panose="020F0502020204030204" pitchFamily="34" charset="0"/>
+                <a:cs typeface="Calibri" panose="020F0502020204030204" pitchFamily="34" charset="0"/>
+              </a:rPr>
+              <a:t>and Data </a:t>
+            </a:r>
+            <a:r>
+              <a:rPr lang="en-US" sz="2800" dirty="0" smtClean="0">
+                <a:latin typeface="Calibri" panose="020F0502020204030204" pitchFamily="34" charset="0"/>
+                <a:cs typeface="Calibri" panose="020F0502020204030204" pitchFamily="34" charset="0"/>
+              </a:rPr>
+              <a:t>Visualization</a:t>
+            </a:r>
+            <a:endParaRPr lang="en-US" sz="2800" dirty="0">
+              <a:latin typeface="Calibri" panose="020F0502020204030204" pitchFamily="34" charset="0"/>
+              <a:cs typeface="Calibri" panose="020F0502020204030204" pitchFamily="34" charset="0"/>
+            </a:endParaRPr>
+          </a:p>
+          <a:p>
+            <a:pPr marL="109728" indent="0" algn="ctr">
+              <a:buNone/>
+            </a:pPr>
+            <a:r>
+              <a:rPr lang="en-US" sz="2400" dirty="0">
+                <a:latin typeface="Calibri" panose="020F0502020204030204" pitchFamily="34" charset="0"/>
+                <a:cs typeface="Calibri" panose="020F0502020204030204" pitchFamily="34" charset="0"/>
+              </a:rPr>
+              <a:t>Basic </a:t>
+            </a:r>
+            <a:r>
+              <a:rPr lang="en-US" sz="2400" dirty="0" smtClean="0">
+                <a:latin typeface="Calibri" panose="020F0502020204030204" pitchFamily="34" charset="0"/>
+                <a:cs typeface="Calibri" panose="020F0502020204030204" pitchFamily="34" charset="0"/>
+              </a:rPr>
+              <a:t>Statistics </a:t>
+            </a:r>
+            <a:r>
+              <a:rPr lang="en-US" sz="2400" dirty="0">
+                <a:latin typeface="Calibri" panose="020F0502020204030204" pitchFamily="34" charset="0"/>
+                <a:cs typeface="Calibri" panose="020F0502020204030204" pitchFamily="34" charset="0"/>
+              </a:rPr>
+              <a:t>and </a:t>
+            </a:r>
+            <a:r>
+              <a:rPr lang="en-US" sz="2400" dirty="0" smtClean="0">
+                <a:latin typeface="Calibri" panose="020F0502020204030204" pitchFamily="34" charset="0"/>
+                <a:cs typeface="Calibri" panose="020F0502020204030204" pitchFamily="34" charset="0"/>
+              </a:rPr>
+              <a:t>Visualization- Organization Types</a:t>
+            </a:r>
+          </a:p>
+          <a:p>
+            <a:pPr marL="109728" indent="0">
+              <a:buNone/>
+            </a:pPr>
+            <a:r>
+              <a:rPr lang="en-US" sz="1600" dirty="0" smtClean="0">
+                <a:latin typeface="Calibri" panose="020F0502020204030204" pitchFamily="34" charset="0"/>
+                <a:cs typeface="Calibri" panose="020F0502020204030204" pitchFamily="34" charset="0"/>
+              </a:rPr>
+              <a:t>Legend for Organization Types:</a:t>
+            </a:r>
+          </a:p>
+          <a:p>
+            <a:r>
+              <a:rPr lang="en-US" sz="1400" dirty="0">
+                <a:latin typeface="Calibri" panose="020F0502020204030204" pitchFamily="34" charset="0"/>
+                <a:cs typeface="Calibri" panose="020F0502020204030204" pitchFamily="34" charset="0"/>
+              </a:rPr>
+              <a:t>1 BSF - Businesses - Financial and Insurance Services</a:t>
+            </a:r>
+          </a:p>
+          <a:p>
+            <a:r>
+              <a:rPr lang="en-US" sz="1400" dirty="0">
+                <a:latin typeface="Calibri" panose="020F0502020204030204" pitchFamily="34" charset="0"/>
+                <a:cs typeface="Calibri" panose="020F0502020204030204" pitchFamily="34" charset="0"/>
+              </a:rPr>
+              <a:t>2 BSO - Businesses - Other</a:t>
+            </a:r>
+          </a:p>
+          <a:p>
+            <a:r>
+              <a:rPr lang="en-US" sz="1400" dirty="0">
+                <a:latin typeface="Calibri" panose="020F0502020204030204" pitchFamily="34" charset="0"/>
+                <a:cs typeface="Calibri" panose="020F0502020204030204" pitchFamily="34" charset="0"/>
+              </a:rPr>
+              <a:t>3 BSR - Businesses - Retail/Merchant – Including Online Retail</a:t>
+            </a:r>
+          </a:p>
+          <a:p>
+            <a:r>
+              <a:rPr lang="en-US" sz="1400" dirty="0">
+                <a:latin typeface="Calibri" panose="020F0502020204030204" pitchFamily="34" charset="0"/>
+                <a:cs typeface="Calibri" panose="020F0502020204030204" pitchFamily="34" charset="0"/>
+              </a:rPr>
+              <a:t>4 EDU - Educational Institutions</a:t>
+            </a:r>
+          </a:p>
+          <a:p>
+            <a:r>
+              <a:rPr lang="en-US" sz="1400" dirty="0">
+                <a:latin typeface="Calibri" panose="020F0502020204030204" pitchFamily="34" charset="0"/>
+                <a:cs typeface="Calibri" panose="020F0502020204030204" pitchFamily="34" charset="0"/>
+              </a:rPr>
+              <a:t>5 GOV - Government &amp; Military</a:t>
+            </a:r>
+          </a:p>
+          <a:p>
+            <a:r>
+              <a:rPr lang="en-US" sz="1400" dirty="0">
+                <a:latin typeface="Calibri" panose="020F0502020204030204" pitchFamily="34" charset="0"/>
+                <a:cs typeface="Calibri" panose="020F0502020204030204" pitchFamily="34" charset="0"/>
+              </a:rPr>
+              <a:t>6 MED - Healthcare - Medical Providers &amp; Medical Insurance Services</a:t>
+            </a:r>
+          </a:p>
+          <a:p>
+            <a:r>
+              <a:rPr lang="en-US" sz="1400" dirty="0">
+                <a:latin typeface="Calibri" panose="020F0502020204030204" pitchFamily="34" charset="0"/>
+                <a:cs typeface="Calibri" panose="020F0502020204030204" pitchFamily="34" charset="0"/>
+              </a:rPr>
+              <a:t>7 NGO - Nonprofit </a:t>
+            </a:r>
+            <a:r>
+              <a:rPr lang="en-US" sz="1400" dirty="0" smtClean="0">
+                <a:latin typeface="Calibri" panose="020F0502020204030204" pitchFamily="34" charset="0"/>
+                <a:cs typeface="Calibri" panose="020F0502020204030204" pitchFamily="34" charset="0"/>
+              </a:rPr>
+              <a:t>Organizations</a:t>
+            </a:r>
+          </a:p>
+          <a:p>
+            <a:pPr marL="109728" indent="0">
+              <a:buNone/>
+            </a:pPr>
+            <a:r>
+              <a:rPr lang="en-US" sz="1600" b="1" dirty="0" smtClean="0">
+                <a:latin typeface="Calibri" panose="020F0502020204030204" pitchFamily="34" charset="0"/>
+                <a:cs typeface="Calibri" panose="020F0502020204030204" pitchFamily="34" charset="0"/>
+              </a:rPr>
+              <a:t>Shows Medical has the largest number of breaches</a:t>
+            </a:r>
+          </a:p>
+          <a:p>
+            <a:pPr marL="109728" indent="0">
+              <a:buNone/>
+            </a:pPr>
+            <a:r>
+              <a:rPr lang="en-US" sz="1600" dirty="0" smtClean="0">
+                <a:latin typeface="Calibri" panose="020F0502020204030204" pitchFamily="34" charset="0"/>
+                <a:cs typeface="Calibri" panose="020F0502020204030204" pitchFamily="34" charset="0"/>
+              </a:rPr>
+              <a:t>Counts by category</a:t>
+            </a:r>
+            <a:endParaRPr lang="en-US" sz="1600" dirty="0">
+              <a:latin typeface="Calibri" panose="020F0502020204030204" pitchFamily="34" charset="0"/>
+              <a:cs typeface="Calibri" panose="020F0502020204030204" pitchFamily="34" charset="0"/>
+            </a:endParaRPr>
+          </a:p>
+          <a:p>
+            <a:r>
+              <a:rPr lang="en-US" sz="1600" dirty="0">
+                <a:latin typeface="Calibri" panose="020F0502020204030204" pitchFamily="34" charset="0"/>
+                <a:cs typeface="Calibri" panose="020F0502020204030204" pitchFamily="34" charset="0"/>
+              </a:rPr>
+              <a:t>1 </a:t>
+            </a:r>
+            <a:r>
+              <a:rPr lang="en-US" sz="1600" dirty="0" smtClean="0">
+                <a:latin typeface="Calibri" panose="020F0502020204030204" pitchFamily="34" charset="0"/>
+                <a:cs typeface="Calibri" panose="020F0502020204030204" pitchFamily="34" charset="0"/>
+              </a:rPr>
+              <a:t>- 746 </a:t>
+            </a:r>
+          </a:p>
+          <a:p>
+            <a:r>
+              <a:rPr lang="en-US" sz="1600" dirty="0" smtClean="0">
+                <a:latin typeface="Calibri" panose="020F0502020204030204" pitchFamily="34" charset="0"/>
+                <a:cs typeface="Calibri" panose="020F0502020204030204" pitchFamily="34" charset="0"/>
+              </a:rPr>
+              <a:t>2 -1028 </a:t>
+            </a:r>
+          </a:p>
+          <a:p>
+            <a:r>
+              <a:rPr lang="en-US" sz="1600" dirty="0" smtClean="0">
+                <a:latin typeface="Calibri" panose="020F0502020204030204" pitchFamily="34" charset="0"/>
+                <a:cs typeface="Calibri" panose="020F0502020204030204" pitchFamily="34" charset="0"/>
+              </a:rPr>
+              <a:t>3  -615 </a:t>
+            </a:r>
+          </a:p>
+          <a:p>
+            <a:r>
+              <a:rPr lang="en-US" sz="1600" dirty="0" smtClean="0">
+                <a:latin typeface="Calibri" panose="020F0502020204030204" pitchFamily="34" charset="0"/>
+                <a:cs typeface="Calibri" panose="020F0502020204030204" pitchFamily="34" charset="0"/>
+              </a:rPr>
+              <a:t>4 - </a:t>
+            </a:r>
+            <a:r>
+              <a:rPr lang="en-US" sz="1600" dirty="0">
+                <a:latin typeface="Calibri" panose="020F0502020204030204" pitchFamily="34" charset="0"/>
+                <a:cs typeface="Calibri" panose="020F0502020204030204" pitchFamily="34" charset="0"/>
+              </a:rPr>
+              <a:t>818 </a:t>
+            </a:r>
+            <a:endParaRPr lang="en-US" sz="1600" dirty="0" smtClean="0">
+              <a:latin typeface="Calibri" panose="020F0502020204030204" pitchFamily="34" charset="0"/>
+              <a:cs typeface="Calibri" panose="020F0502020204030204" pitchFamily="34" charset="0"/>
+            </a:endParaRPr>
+          </a:p>
+          <a:p>
+            <a:r>
+              <a:rPr lang="en-US" sz="1600" dirty="0" smtClean="0">
+                <a:latin typeface="Calibri" panose="020F0502020204030204" pitchFamily="34" charset="0"/>
+                <a:cs typeface="Calibri" panose="020F0502020204030204" pitchFamily="34" charset="0"/>
+              </a:rPr>
+              <a:t>5 - 775 </a:t>
+            </a:r>
+          </a:p>
+          <a:p>
+            <a:r>
+              <a:rPr lang="en-US" sz="1600" dirty="0" smtClean="0">
+                <a:latin typeface="Calibri" panose="020F0502020204030204" pitchFamily="34" charset="0"/>
+                <a:cs typeface="Calibri" panose="020F0502020204030204" pitchFamily="34" charset="0"/>
+              </a:rPr>
+              <a:t>6 - </a:t>
+            </a:r>
+            <a:r>
+              <a:rPr lang="en-US" sz="1600" dirty="0">
+                <a:latin typeface="Calibri" panose="020F0502020204030204" pitchFamily="34" charset="0"/>
+                <a:cs typeface="Calibri" panose="020F0502020204030204" pitchFamily="34" charset="0"/>
+              </a:rPr>
+              <a:t>4077 </a:t>
+            </a:r>
+            <a:endParaRPr lang="en-US" sz="1600" dirty="0" smtClean="0">
+              <a:latin typeface="Calibri" panose="020F0502020204030204" pitchFamily="34" charset="0"/>
+              <a:cs typeface="Calibri" panose="020F0502020204030204" pitchFamily="34" charset="0"/>
+            </a:endParaRPr>
+          </a:p>
+          <a:p>
+            <a:r>
+              <a:rPr lang="en-US" sz="1600" dirty="0" smtClean="0">
+                <a:latin typeface="Calibri" panose="020F0502020204030204" pitchFamily="34" charset="0"/>
+                <a:cs typeface="Calibri" panose="020F0502020204030204" pitchFamily="34" charset="0"/>
+              </a:rPr>
+              <a:t>7 -  118 </a:t>
+            </a:r>
+            <a:endParaRPr lang="en-US" sz="1600" dirty="0">
+              <a:latin typeface="Calibri" panose="020F0502020204030204" pitchFamily="34" charset="0"/>
+              <a:cs typeface="Calibri" panose="020F0502020204030204" pitchFamily="34" charset="0"/>
+            </a:endParaRPr>
+          </a:p>
+          <a:p>
+            <a:pPr marL="109728" indent="0">
+              <a:buNone/>
+            </a:pPr>
+            <a:endParaRPr lang="en-US" sz="2800" dirty="0" smtClean="0">
+              <a:latin typeface="Calibri" panose="020F0502020204030204" pitchFamily="34" charset="0"/>
+              <a:cs typeface="Calibri" panose="020F0502020204030204" pitchFamily="34" charset="0"/>
+            </a:endParaRPr>
+          </a:p>
+        </p:txBody>
+      </p:sp>
+      <p:pic>
+        <p:nvPicPr>
+          <p:cNvPr id="3" name="Picture 2"/>
+          <p:cNvPicPr>
+            <a:picLocks noChangeAspect="1"/>
+          </p:cNvPicPr>
+          <p:nvPr/>
+        </p:nvPicPr>
+        <p:blipFill>
+          <a:blip r:embed="rId2">
+            <a:extLst>
+              <a:ext uri="{28A0092B-C50C-407E-A947-70E740481C1C}">
+                <a14:useLocalDpi xmlns:a14="http://schemas.microsoft.com/office/drawing/2010/main" val="0"/>
+              </a:ext>
+            </a:extLst>
+          </a:blip>
+          <a:stretch>
+            <a:fillRect/>
+          </a:stretch>
+        </p:blipFill>
+        <p:spPr>
+          <a:xfrm>
+            <a:off x="4682836" y="3352800"/>
+            <a:ext cx="4461164" cy="3200400"/>
+          </a:xfrm>
+          <a:prstGeom prst="rect">
+            <a:avLst/>
+          </a:prstGeom>
+        </p:spPr>
+      </p:pic>
+    </p:spTree>
+    <p:extLst>
+      <p:ext uri="{BB962C8B-B14F-4D97-AF65-F5344CB8AC3E}">
+        <p14:creationId xmlns:p14="http://schemas.microsoft.com/office/powerpoint/2010/main" val="541929688"/>
+      </p:ext>
+    </p:extLst>
+  </p:cSld>
+  <p:clrMapOvr>
+    <a:masterClrMapping/>
+  </p:clrMapOvr>
+</p:sld>
+</file>
+
+<file path=ppt/slides/slide15.xml><?xml version="1.0" encoding="utf-8"?>
+<p:sld xmlns:a="http://schemas.openxmlformats.org/drawingml/2006/main" xmlns:r="http://schemas.openxmlformats.org/officeDocument/2006/relationships" xmlns:p="http://schemas.openxmlformats.org/presentationml/2006/main">
+  <p:cSld>
+    <p:spTree>
+      <p:nvGrpSpPr>
+        <p:cNvPr id="1" name=""/>
+        <p:cNvGrpSpPr/>
+        <p:nvPr/>
+      </p:nvGrpSpPr>
+      <p:grpSpPr>
+        <a:xfrm>
+          <a:off x="0" y="0"/>
+          <a:ext cx="0" cy="0"/>
+          <a:chOff x="0" y="0"/>
+          <a:chExt cx="0" cy="0"/>
+        </a:xfrm>
+      </p:grpSpPr>
+      <p:sp>
+        <p:nvSpPr>
+          <p:cNvPr id="2" name="Content Placeholder 1"/>
+          <p:cNvSpPr>
+            <a:spLocks noGrp="1"/>
+          </p:cNvSpPr>
+          <p:nvPr>
+            <p:ph idx="1"/>
+          </p:nvPr>
+        </p:nvSpPr>
+        <p:spPr>
+          <a:xfrm>
+            <a:off x="457200" y="381000"/>
+            <a:ext cx="8229600" cy="6172200"/>
+          </a:xfrm>
+        </p:spPr>
+        <p:txBody>
+          <a:bodyPr>
+            <a:normAutofit/>
+          </a:bodyPr>
+          <a:lstStyle/>
+          <a:p>
+            <a:pPr marL="109728" indent="0" algn="ctr">
+              <a:buNone/>
+            </a:pPr>
+            <a:r>
+              <a:rPr lang="en-US" sz="2800" dirty="0">
+                <a:latin typeface="Calibri" panose="020F0502020204030204" pitchFamily="34" charset="0"/>
+                <a:cs typeface="Calibri" panose="020F0502020204030204" pitchFamily="34" charset="0"/>
+              </a:rPr>
+              <a:t>Exploratory Data </a:t>
+            </a:r>
+            <a:r>
+              <a:rPr lang="en-US" sz="2800" dirty="0" smtClean="0">
+                <a:latin typeface="Calibri" panose="020F0502020204030204" pitchFamily="34" charset="0"/>
+                <a:cs typeface="Calibri" panose="020F0502020204030204" pitchFamily="34" charset="0"/>
+              </a:rPr>
+              <a:t>Analysis </a:t>
+            </a:r>
+            <a:r>
+              <a:rPr lang="en-US" sz="2800" dirty="0">
+                <a:latin typeface="Calibri" panose="020F0502020204030204" pitchFamily="34" charset="0"/>
+                <a:cs typeface="Calibri" panose="020F0502020204030204" pitchFamily="34" charset="0"/>
+              </a:rPr>
+              <a:t>and Data </a:t>
+            </a:r>
+            <a:r>
+              <a:rPr lang="en-US" sz="2800" dirty="0" smtClean="0">
+                <a:latin typeface="Calibri" panose="020F0502020204030204" pitchFamily="34" charset="0"/>
+                <a:cs typeface="Calibri" panose="020F0502020204030204" pitchFamily="34" charset="0"/>
+              </a:rPr>
+              <a:t>Visualization</a:t>
+            </a:r>
+            <a:endParaRPr lang="en-US" sz="2800" dirty="0">
+              <a:latin typeface="Calibri" panose="020F0502020204030204" pitchFamily="34" charset="0"/>
+              <a:cs typeface="Calibri" panose="020F0502020204030204" pitchFamily="34" charset="0"/>
+            </a:endParaRPr>
+          </a:p>
+          <a:p>
+            <a:pPr marL="109728" indent="0" algn="ctr">
+              <a:buNone/>
+            </a:pPr>
+            <a:r>
+              <a:rPr lang="en-US" sz="2400" dirty="0">
+                <a:latin typeface="Calibri" panose="020F0502020204030204" pitchFamily="34" charset="0"/>
+                <a:cs typeface="Calibri" panose="020F0502020204030204" pitchFamily="34" charset="0"/>
+              </a:rPr>
+              <a:t>Basic </a:t>
+            </a:r>
+            <a:r>
+              <a:rPr lang="en-US" sz="2400" dirty="0" smtClean="0">
+                <a:latin typeface="Calibri" panose="020F0502020204030204" pitchFamily="34" charset="0"/>
+                <a:cs typeface="Calibri" panose="020F0502020204030204" pitchFamily="34" charset="0"/>
+              </a:rPr>
+              <a:t>Statistics </a:t>
+            </a:r>
+            <a:r>
+              <a:rPr lang="en-US" sz="2400" dirty="0">
+                <a:latin typeface="Calibri" panose="020F0502020204030204" pitchFamily="34" charset="0"/>
+                <a:cs typeface="Calibri" panose="020F0502020204030204" pitchFamily="34" charset="0"/>
+              </a:rPr>
+              <a:t>and </a:t>
+            </a:r>
+            <a:r>
+              <a:rPr lang="en-US" sz="2400" dirty="0" smtClean="0">
+                <a:latin typeface="Calibri" panose="020F0502020204030204" pitchFamily="34" charset="0"/>
+                <a:cs typeface="Calibri" panose="020F0502020204030204" pitchFamily="34" charset="0"/>
+              </a:rPr>
+              <a:t>Visualization- State CA top breaches</a:t>
+            </a:r>
+          </a:p>
+          <a:p>
+            <a:pPr marL="109728" indent="0">
+              <a:buNone/>
+            </a:pPr>
+            <a:endParaRPr lang="en-US" sz="2800" dirty="0" smtClean="0">
+              <a:latin typeface="Calibri" panose="020F0502020204030204" pitchFamily="34" charset="0"/>
+              <a:cs typeface="Calibri" panose="020F0502020204030204" pitchFamily="34" charset="0"/>
+            </a:endParaRPr>
+          </a:p>
+        </p:txBody>
+      </p:sp>
+      <p:pic>
+        <p:nvPicPr>
+          <p:cNvPr id="3" name="Picture 2"/>
+          <p:cNvPicPr>
+            <a:picLocks noChangeAspect="1"/>
+          </p:cNvPicPr>
+          <p:nvPr/>
+        </p:nvPicPr>
+        <p:blipFill>
+          <a:blip r:embed="rId2">
+            <a:extLst>
+              <a:ext uri="{28A0092B-C50C-407E-A947-70E740481C1C}">
+                <a14:useLocalDpi xmlns:a14="http://schemas.microsoft.com/office/drawing/2010/main" val="0"/>
+              </a:ext>
+            </a:extLst>
+          </a:blip>
+          <a:stretch>
+            <a:fillRect/>
+          </a:stretch>
+        </p:blipFill>
+        <p:spPr>
+          <a:xfrm>
+            <a:off x="0" y="1295400"/>
+            <a:ext cx="9067800" cy="5193323"/>
+          </a:xfrm>
+          <a:prstGeom prst="rect">
+            <a:avLst/>
+          </a:prstGeom>
+        </p:spPr>
+      </p:pic>
+    </p:spTree>
+    <p:extLst>
+      <p:ext uri="{BB962C8B-B14F-4D97-AF65-F5344CB8AC3E}">
+        <p14:creationId xmlns:p14="http://schemas.microsoft.com/office/powerpoint/2010/main" val="3694028221"/>
+      </p:ext>
+    </p:extLst>
+  </p:cSld>
+  <p:clrMapOvr>
+    <a:masterClrMapping/>
+  </p:clrMapOvr>
+</p:sld>
+</file>
+
+<file path=ppt/slides/slide16.xml><?xml version="1.0" encoding="utf-8"?>
+<p:sld xmlns:a="http://schemas.openxmlformats.org/drawingml/2006/main" xmlns:r="http://schemas.openxmlformats.org/officeDocument/2006/relationships" xmlns:p="http://schemas.openxmlformats.org/presentationml/2006/main">
+  <p:cSld>
+    <p:spTree>
+      <p:nvGrpSpPr>
+        <p:cNvPr id="1" name=""/>
+        <p:cNvGrpSpPr/>
+        <p:nvPr/>
+      </p:nvGrpSpPr>
+      <p:grpSpPr>
+        <a:xfrm>
+          <a:off x="0" y="0"/>
+          <a:ext cx="0" cy="0"/>
+          <a:chOff x="0" y="0"/>
+          <a:chExt cx="0" cy="0"/>
+        </a:xfrm>
+      </p:grpSpPr>
+      <p:sp>
+        <p:nvSpPr>
+          <p:cNvPr id="2" name="Content Placeholder 1"/>
+          <p:cNvSpPr>
+            <a:spLocks noGrp="1"/>
+          </p:cNvSpPr>
+          <p:nvPr>
+            <p:ph idx="1"/>
+          </p:nvPr>
+        </p:nvSpPr>
+        <p:spPr>
+          <a:xfrm>
+            <a:off x="457200" y="381000"/>
+            <a:ext cx="8229600" cy="6172200"/>
+          </a:xfrm>
+        </p:spPr>
+        <p:txBody>
+          <a:bodyPr>
+            <a:normAutofit fontScale="92500" lnSpcReduction="10000"/>
+          </a:bodyPr>
+          <a:lstStyle/>
+          <a:p>
+            <a:pPr marL="109728" indent="0" algn="ctr">
+              <a:buNone/>
+            </a:pPr>
+            <a:r>
+              <a:rPr lang="en-US" sz="2800" dirty="0">
+                <a:latin typeface="Calibri" panose="020F0502020204030204" pitchFamily="34" charset="0"/>
+                <a:cs typeface="Calibri" panose="020F0502020204030204" pitchFamily="34" charset="0"/>
+              </a:rPr>
+              <a:t>Exploratory Data </a:t>
+            </a:r>
+            <a:r>
+              <a:rPr lang="en-US" sz="2800" dirty="0" smtClean="0">
+                <a:latin typeface="Calibri" panose="020F0502020204030204" pitchFamily="34" charset="0"/>
+                <a:cs typeface="Calibri" panose="020F0502020204030204" pitchFamily="34" charset="0"/>
+              </a:rPr>
+              <a:t>Analysis </a:t>
+            </a:r>
+            <a:r>
+              <a:rPr lang="en-US" sz="2800" dirty="0">
+                <a:latin typeface="Calibri" panose="020F0502020204030204" pitchFamily="34" charset="0"/>
+                <a:cs typeface="Calibri" panose="020F0502020204030204" pitchFamily="34" charset="0"/>
+              </a:rPr>
+              <a:t>and Data </a:t>
+            </a:r>
+            <a:r>
+              <a:rPr lang="en-US" sz="2800" dirty="0" smtClean="0">
+                <a:latin typeface="Calibri" panose="020F0502020204030204" pitchFamily="34" charset="0"/>
+                <a:cs typeface="Calibri" panose="020F0502020204030204" pitchFamily="34" charset="0"/>
+              </a:rPr>
+              <a:t>Visualization</a:t>
+            </a:r>
+            <a:endParaRPr lang="en-US" sz="2800" dirty="0">
+              <a:latin typeface="Calibri" panose="020F0502020204030204" pitchFamily="34" charset="0"/>
+              <a:cs typeface="Calibri" panose="020F0502020204030204" pitchFamily="34" charset="0"/>
+            </a:endParaRPr>
+          </a:p>
+          <a:p>
+            <a:pPr marL="109728" indent="0" algn="ctr">
+              <a:buNone/>
+            </a:pPr>
+            <a:r>
+              <a:rPr lang="en-US" sz="2400" dirty="0">
+                <a:latin typeface="Calibri" panose="020F0502020204030204" pitchFamily="34" charset="0"/>
+                <a:cs typeface="Calibri" panose="020F0502020204030204" pitchFamily="34" charset="0"/>
+              </a:rPr>
+              <a:t>Basic </a:t>
+            </a:r>
+            <a:r>
+              <a:rPr lang="en-US" sz="2400" dirty="0" smtClean="0">
+                <a:latin typeface="Calibri" panose="020F0502020204030204" pitchFamily="34" charset="0"/>
+                <a:cs typeface="Calibri" panose="020F0502020204030204" pitchFamily="34" charset="0"/>
+              </a:rPr>
+              <a:t>Statistics </a:t>
+            </a:r>
+            <a:r>
+              <a:rPr lang="en-US" sz="2400" dirty="0">
+                <a:latin typeface="Calibri" panose="020F0502020204030204" pitchFamily="34" charset="0"/>
+                <a:cs typeface="Calibri" panose="020F0502020204030204" pitchFamily="34" charset="0"/>
+              </a:rPr>
+              <a:t>and </a:t>
+            </a:r>
+            <a:r>
+              <a:rPr lang="en-US" sz="2400" dirty="0" smtClean="0">
+                <a:latin typeface="Calibri" panose="020F0502020204030204" pitchFamily="34" charset="0"/>
+                <a:cs typeface="Calibri" panose="020F0502020204030204" pitchFamily="34" charset="0"/>
+              </a:rPr>
+              <a:t>Visualization- Breach Types</a:t>
+            </a:r>
+          </a:p>
+          <a:p>
+            <a:pPr marL="109728" indent="0">
+              <a:buNone/>
+            </a:pPr>
+            <a:r>
+              <a:rPr lang="en-US" sz="2400" dirty="0" smtClean="0">
+                <a:latin typeface="Calibri" panose="020F0502020204030204" pitchFamily="34" charset="0"/>
+                <a:cs typeface="Calibri" panose="020F0502020204030204" pitchFamily="34" charset="0"/>
+              </a:rPr>
+              <a:t>Legend for Breach Types:</a:t>
+            </a:r>
+          </a:p>
+          <a:p>
+            <a:r>
+              <a:rPr lang="en-US" sz="1600" dirty="0">
+                <a:latin typeface="Calibri" panose="020F0502020204030204" pitchFamily="34" charset="0"/>
+                <a:cs typeface="Calibri" panose="020F0502020204030204" pitchFamily="34" charset="0"/>
+              </a:rPr>
+              <a:t>1: CARD - Payment Card Fraud: </a:t>
+            </a:r>
+            <a:endParaRPr lang="en-US" sz="1600" dirty="0" smtClean="0">
+              <a:latin typeface="Calibri" panose="020F0502020204030204" pitchFamily="34" charset="0"/>
+              <a:cs typeface="Calibri" panose="020F0502020204030204" pitchFamily="34" charset="0"/>
+            </a:endParaRPr>
+          </a:p>
+          <a:p>
+            <a:r>
+              <a:rPr lang="en-US" sz="1600" dirty="0" smtClean="0">
+                <a:latin typeface="Calibri" panose="020F0502020204030204" pitchFamily="34" charset="0"/>
+                <a:cs typeface="Calibri" panose="020F0502020204030204" pitchFamily="34" charset="0"/>
+              </a:rPr>
+              <a:t>2</a:t>
+            </a:r>
+            <a:r>
+              <a:rPr lang="en-US" sz="1600" dirty="0">
+                <a:latin typeface="Calibri" panose="020F0502020204030204" pitchFamily="34" charset="0"/>
+                <a:cs typeface="Calibri" panose="020F0502020204030204" pitchFamily="34" charset="0"/>
+              </a:rPr>
+              <a:t>: HACK - Hacking or </a:t>
+            </a:r>
+            <a:r>
+              <a:rPr lang="en-US" sz="1600" dirty="0" smtClean="0">
+                <a:latin typeface="Calibri" panose="020F0502020204030204" pitchFamily="34" charset="0"/>
+                <a:cs typeface="Calibri" panose="020F0502020204030204" pitchFamily="34" charset="0"/>
+              </a:rPr>
+              <a:t>Malware</a:t>
+            </a:r>
+          </a:p>
+          <a:p>
+            <a:r>
+              <a:rPr lang="en-US" sz="1600" dirty="0" smtClean="0">
+                <a:latin typeface="Calibri" panose="020F0502020204030204" pitchFamily="34" charset="0"/>
+                <a:cs typeface="Calibri" panose="020F0502020204030204" pitchFamily="34" charset="0"/>
+              </a:rPr>
+              <a:t>3</a:t>
+            </a:r>
+            <a:r>
+              <a:rPr lang="en-US" sz="1600" dirty="0">
+                <a:latin typeface="Calibri" panose="020F0502020204030204" pitchFamily="34" charset="0"/>
+                <a:cs typeface="Calibri" panose="020F0502020204030204" pitchFamily="34" charset="0"/>
+              </a:rPr>
+              <a:t>: INSD </a:t>
+            </a:r>
+            <a:r>
+              <a:rPr lang="en-US" sz="1600" dirty="0" smtClean="0">
+                <a:latin typeface="Calibri" panose="020F0502020204030204" pitchFamily="34" charset="0"/>
+                <a:cs typeface="Calibri" panose="020F0502020204030204" pitchFamily="34" charset="0"/>
+              </a:rPr>
+              <a:t>– Insider</a:t>
+            </a:r>
+          </a:p>
+          <a:p>
+            <a:r>
+              <a:rPr lang="en-US" sz="1600" dirty="0" smtClean="0">
+                <a:latin typeface="Calibri" panose="020F0502020204030204" pitchFamily="34" charset="0"/>
+                <a:cs typeface="Calibri" panose="020F0502020204030204" pitchFamily="34" charset="0"/>
+              </a:rPr>
+              <a:t>4</a:t>
+            </a:r>
+            <a:r>
+              <a:rPr lang="en-US" sz="1600" dirty="0">
+                <a:latin typeface="Calibri" panose="020F0502020204030204" pitchFamily="34" charset="0"/>
+                <a:cs typeface="Calibri" panose="020F0502020204030204" pitchFamily="34" charset="0"/>
+              </a:rPr>
+              <a:t>: PHYS - Physical </a:t>
+            </a:r>
+            <a:r>
+              <a:rPr lang="en-US" sz="1600" dirty="0" smtClean="0">
+                <a:latin typeface="Calibri" panose="020F0502020204030204" pitchFamily="34" charset="0"/>
+                <a:cs typeface="Calibri" panose="020F0502020204030204" pitchFamily="34" charset="0"/>
+              </a:rPr>
+              <a:t>Loss</a:t>
+            </a:r>
+          </a:p>
+          <a:p>
+            <a:r>
+              <a:rPr lang="en-US" sz="1600" dirty="0" smtClean="0">
+                <a:latin typeface="Calibri" panose="020F0502020204030204" pitchFamily="34" charset="0"/>
+                <a:cs typeface="Calibri" panose="020F0502020204030204" pitchFamily="34" charset="0"/>
+              </a:rPr>
+              <a:t>5</a:t>
+            </a:r>
+            <a:r>
+              <a:rPr lang="en-US" sz="1600" dirty="0">
+                <a:latin typeface="Calibri" panose="020F0502020204030204" pitchFamily="34" charset="0"/>
+                <a:cs typeface="Calibri" panose="020F0502020204030204" pitchFamily="34" charset="0"/>
+              </a:rPr>
+              <a:t>: PORT - Portable </a:t>
+            </a:r>
+            <a:r>
+              <a:rPr lang="en-US" sz="1600" dirty="0" smtClean="0">
+                <a:latin typeface="Calibri" panose="020F0502020204030204" pitchFamily="34" charset="0"/>
+                <a:cs typeface="Calibri" panose="020F0502020204030204" pitchFamily="34" charset="0"/>
+              </a:rPr>
+              <a:t>Device</a:t>
+            </a:r>
+          </a:p>
+          <a:p>
+            <a:r>
+              <a:rPr lang="en-US" sz="1600" dirty="0" smtClean="0">
+                <a:latin typeface="Calibri" panose="020F0502020204030204" pitchFamily="34" charset="0"/>
+                <a:cs typeface="Calibri" panose="020F0502020204030204" pitchFamily="34" charset="0"/>
+              </a:rPr>
+              <a:t>6</a:t>
+            </a:r>
+            <a:r>
+              <a:rPr lang="en-US" sz="1600" dirty="0">
+                <a:latin typeface="Calibri" panose="020F0502020204030204" pitchFamily="34" charset="0"/>
+                <a:cs typeface="Calibri" panose="020F0502020204030204" pitchFamily="34" charset="0"/>
+              </a:rPr>
+              <a:t>: STAT - Stationary </a:t>
+            </a:r>
+            <a:r>
+              <a:rPr lang="en-US" sz="1600" dirty="0" smtClean="0">
+                <a:latin typeface="Calibri" panose="020F0502020204030204" pitchFamily="34" charset="0"/>
+                <a:cs typeface="Calibri" panose="020F0502020204030204" pitchFamily="34" charset="0"/>
+              </a:rPr>
+              <a:t>Device</a:t>
+            </a:r>
+          </a:p>
+          <a:p>
+            <a:r>
+              <a:rPr lang="en-US" sz="1600" dirty="0" smtClean="0">
+                <a:latin typeface="Calibri" panose="020F0502020204030204" pitchFamily="34" charset="0"/>
+                <a:cs typeface="Calibri" panose="020F0502020204030204" pitchFamily="34" charset="0"/>
+              </a:rPr>
+              <a:t>7: DISC </a:t>
+            </a:r>
+            <a:r>
+              <a:rPr lang="en-US" sz="1600" dirty="0">
+                <a:latin typeface="Calibri" panose="020F0502020204030204" pitchFamily="34" charset="0"/>
+                <a:cs typeface="Calibri" panose="020F0502020204030204" pitchFamily="34" charset="0"/>
+              </a:rPr>
+              <a:t>- Unintended </a:t>
+            </a:r>
+            <a:r>
+              <a:rPr lang="en-US" sz="1600" dirty="0" smtClean="0">
+                <a:latin typeface="Calibri" panose="020F0502020204030204" pitchFamily="34" charset="0"/>
+                <a:cs typeface="Calibri" panose="020F0502020204030204" pitchFamily="34" charset="0"/>
+              </a:rPr>
+              <a:t>Disclosure</a:t>
+            </a:r>
+          </a:p>
+          <a:p>
+            <a:r>
+              <a:rPr lang="en-US" sz="1600" dirty="0" smtClean="0">
+                <a:latin typeface="Calibri" panose="020F0502020204030204" pitchFamily="34" charset="0"/>
+                <a:cs typeface="Calibri" panose="020F0502020204030204" pitchFamily="34" charset="0"/>
+              </a:rPr>
+              <a:t>0</a:t>
+            </a:r>
+            <a:r>
+              <a:rPr lang="en-US" sz="1600" dirty="0">
+                <a:latin typeface="Calibri" panose="020F0502020204030204" pitchFamily="34" charset="0"/>
+                <a:cs typeface="Calibri" panose="020F0502020204030204" pitchFamily="34" charset="0"/>
+              </a:rPr>
+              <a:t>: </a:t>
+            </a:r>
+            <a:r>
+              <a:rPr lang="en-US" sz="1600" dirty="0" smtClean="0">
+                <a:latin typeface="Calibri" panose="020F0502020204030204" pitchFamily="34" charset="0"/>
+                <a:cs typeface="Calibri" panose="020F0502020204030204" pitchFamily="34" charset="0"/>
+              </a:rPr>
+              <a:t>Unknown</a:t>
+            </a:r>
+          </a:p>
+          <a:p>
+            <a:pPr marL="109728" indent="0">
+              <a:buNone/>
+            </a:pPr>
+            <a:r>
+              <a:rPr lang="en-US" sz="1700" b="1" dirty="0" smtClean="0">
+                <a:latin typeface="Calibri" panose="020F0502020204030204" pitchFamily="34" charset="0"/>
+                <a:cs typeface="Calibri" panose="020F0502020204030204" pitchFamily="34" charset="0"/>
+              </a:rPr>
+              <a:t>Top Breach Type is ‘HACK’</a:t>
+            </a:r>
+            <a:endParaRPr lang="en-US" sz="1700" b="1" dirty="0">
+              <a:latin typeface="Calibri" panose="020F0502020204030204" pitchFamily="34" charset="0"/>
+              <a:cs typeface="Calibri" panose="020F0502020204030204" pitchFamily="34" charset="0"/>
+            </a:endParaRPr>
+          </a:p>
+          <a:p>
+            <a:r>
+              <a:rPr lang="en-US" sz="1600" dirty="0" smtClean="0">
+                <a:latin typeface="Calibri" panose="020F0502020204030204" pitchFamily="34" charset="0"/>
+                <a:cs typeface="Calibri" panose="020F0502020204030204" pitchFamily="34" charset="0"/>
+              </a:rPr>
+              <a:t>Counts:</a:t>
+            </a:r>
+            <a:endParaRPr lang="en-US" sz="1600" dirty="0">
+              <a:latin typeface="Calibri" panose="020F0502020204030204" pitchFamily="34" charset="0"/>
+              <a:cs typeface="Calibri" panose="020F0502020204030204" pitchFamily="34" charset="0"/>
+            </a:endParaRPr>
+          </a:p>
+          <a:p>
+            <a:r>
+              <a:rPr lang="en-US" sz="1600" dirty="0" smtClean="0">
+                <a:latin typeface="Calibri" panose="020F0502020204030204" pitchFamily="34" charset="0"/>
+                <a:cs typeface="Calibri" panose="020F0502020204030204" pitchFamily="34" charset="0"/>
+              </a:rPr>
+              <a:t>CARD 	68 </a:t>
+            </a:r>
+          </a:p>
+          <a:p>
+            <a:r>
+              <a:rPr lang="en-US" sz="1600" dirty="0" smtClean="0">
+                <a:latin typeface="Calibri" panose="020F0502020204030204" pitchFamily="34" charset="0"/>
+                <a:cs typeface="Calibri" panose="020F0502020204030204" pitchFamily="34" charset="0"/>
+              </a:rPr>
+              <a:t>DISC 	1708 </a:t>
+            </a:r>
+          </a:p>
+          <a:p>
+            <a:r>
+              <a:rPr lang="en-US" sz="1600" dirty="0" smtClean="0">
+                <a:latin typeface="Calibri" panose="020F0502020204030204" pitchFamily="34" charset="0"/>
+                <a:cs typeface="Calibri" panose="020F0502020204030204" pitchFamily="34" charset="0"/>
+              </a:rPr>
+              <a:t>HACK 	2431 </a:t>
+            </a:r>
+          </a:p>
+          <a:p>
+            <a:r>
+              <a:rPr lang="en-US" sz="1600" dirty="0" smtClean="0">
+                <a:latin typeface="Calibri" panose="020F0502020204030204" pitchFamily="34" charset="0"/>
+                <a:cs typeface="Calibri" panose="020F0502020204030204" pitchFamily="34" charset="0"/>
+              </a:rPr>
+              <a:t>INSD 	609 </a:t>
+            </a:r>
+          </a:p>
+          <a:p>
+            <a:r>
+              <a:rPr lang="en-US" sz="1600" dirty="0" smtClean="0">
+                <a:latin typeface="Calibri" panose="020F0502020204030204" pitchFamily="34" charset="0"/>
+                <a:cs typeface="Calibri" panose="020F0502020204030204" pitchFamily="34" charset="0"/>
+              </a:rPr>
+              <a:t>PHYS 	1691 </a:t>
+            </a:r>
+          </a:p>
+          <a:p>
+            <a:r>
+              <a:rPr lang="en-US" sz="1600" dirty="0" smtClean="0">
+                <a:latin typeface="Calibri" panose="020F0502020204030204" pitchFamily="34" charset="0"/>
+                <a:cs typeface="Calibri" panose="020F0502020204030204" pitchFamily="34" charset="0"/>
+              </a:rPr>
+              <a:t>PORT 	1172 </a:t>
+            </a:r>
+          </a:p>
+          <a:p>
+            <a:r>
+              <a:rPr lang="en-US" sz="1600" dirty="0" smtClean="0">
+                <a:latin typeface="Calibri" panose="020F0502020204030204" pitchFamily="34" charset="0"/>
+                <a:cs typeface="Calibri" panose="020F0502020204030204" pitchFamily="34" charset="0"/>
+              </a:rPr>
+              <a:t>STAT	249 </a:t>
+            </a:r>
+          </a:p>
+          <a:p>
+            <a:r>
+              <a:rPr lang="en-US" sz="1600" dirty="0" smtClean="0">
+                <a:latin typeface="Calibri" panose="020F0502020204030204" pitchFamily="34" charset="0"/>
+                <a:cs typeface="Calibri" panose="020F0502020204030204" pitchFamily="34" charset="0"/>
+              </a:rPr>
+              <a:t>UNKN 	249 </a:t>
+            </a:r>
+            <a:endParaRPr lang="en-US" sz="1600" dirty="0">
+              <a:latin typeface="Calibri" panose="020F0502020204030204" pitchFamily="34" charset="0"/>
+              <a:cs typeface="Calibri" panose="020F0502020204030204" pitchFamily="34" charset="0"/>
+            </a:endParaRPr>
+          </a:p>
+        </p:txBody>
+      </p:sp>
+      <p:pic>
+        <p:nvPicPr>
+          <p:cNvPr id="3" name="Picture 2"/>
+          <p:cNvPicPr>
+            <a:picLocks noChangeAspect="1"/>
+          </p:cNvPicPr>
+          <p:nvPr/>
+        </p:nvPicPr>
+        <p:blipFill>
+          <a:blip r:embed="rId2">
+            <a:extLst>
+              <a:ext uri="{28A0092B-C50C-407E-A947-70E740481C1C}">
+                <a14:useLocalDpi xmlns:a14="http://schemas.microsoft.com/office/drawing/2010/main" val="0"/>
+              </a:ext>
+            </a:extLst>
+          </a:blip>
+          <a:stretch>
+            <a:fillRect/>
+          </a:stretch>
+        </p:blipFill>
+        <p:spPr>
+          <a:xfrm>
+            <a:off x="3810000" y="1447800"/>
+            <a:ext cx="5029200" cy="4190999"/>
+          </a:xfrm>
+          <a:prstGeom prst="rect">
+            <a:avLst/>
+          </a:prstGeom>
+        </p:spPr>
+      </p:pic>
+    </p:spTree>
+    <p:extLst>
+      <p:ext uri="{BB962C8B-B14F-4D97-AF65-F5344CB8AC3E}">
+        <p14:creationId xmlns:p14="http://schemas.microsoft.com/office/powerpoint/2010/main" val="1757371064"/>
+      </p:ext>
+    </p:extLst>
+  </p:cSld>
+  <p:clrMapOvr>
+    <a:masterClrMapping/>
+  </p:clrMapOvr>
+</p:sld>
+</file>
+
+<file path=ppt/slides/slide17.xml><?xml version="1.0" encoding="utf-8"?>
+<p:sld xmlns:a="http://schemas.openxmlformats.org/drawingml/2006/main" xmlns:r="http://schemas.openxmlformats.org/officeDocument/2006/relationships" xmlns:p="http://schemas.openxmlformats.org/presentationml/2006/main">
+  <p:cSld>
+    <p:spTree>
+      <p:nvGrpSpPr>
+        <p:cNvPr id="1" name=""/>
+        <p:cNvGrpSpPr/>
+        <p:nvPr/>
+      </p:nvGrpSpPr>
+      <p:grpSpPr>
+        <a:xfrm>
+          <a:off x="0" y="0"/>
+          <a:ext cx="0" cy="0"/>
+          <a:chOff x="0" y="0"/>
+          <a:chExt cx="0" cy="0"/>
+        </a:xfrm>
+      </p:grpSpPr>
+      <p:sp>
+        <p:nvSpPr>
+          <p:cNvPr id="2" name="Content Placeholder 1"/>
+          <p:cNvSpPr>
+            <a:spLocks noGrp="1"/>
+          </p:cNvSpPr>
+          <p:nvPr>
+            <p:ph idx="1"/>
+          </p:nvPr>
+        </p:nvSpPr>
+        <p:spPr>
+          <a:xfrm>
+            <a:off x="457200" y="381000"/>
+            <a:ext cx="8229600" cy="6172200"/>
+          </a:xfrm>
+        </p:spPr>
+        <p:txBody>
+          <a:bodyPr>
+            <a:normAutofit/>
+          </a:bodyPr>
+          <a:lstStyle/>
+          <a:p>
+            <a:pPr marL="109728" indent="0" algn="ctr">
+              <a:buNone/>
+            </a:pPr>
+            <a:r>
+              <a:rPr lang="en-US" sz="2800" dirty="0">
+                <a:latin typeface="Calibri" panose="020F0502020204030204" pitchFamily="34" charset="0"/>
+                <a:cs typeface="Calibri" panose="020F0502020204030204" pitchFamily="34" charset="0"/>
+              </a:rPr>
+              <a:t>Exploratory Data </a:t>
+            </a:r>
+            <a:r>
+              <a:rPr lang="en-US" sz="2800" dirty="0" smtClean="0">
+                <a:latin typeface="Calibri" panose="020F0502020204030204" pitchFamily="34" charset="0"/>
+                <a:cs typeface="Calibri" panose="020F0502020204030204" pitchFamily="34" charset="0"/>
+              </a:rPr>
+              <a:t>Analysis </a:t>
+            </a:r>
+            <a:r>
+              <a:rPr lang="en-US" sz="2800" dirty="0">
+                <a:latin typeface="Calibri" panose="020F0502020204030204" pitchFamily="34" charset="0"/>
+                <a:cs typeface="Calibri" panose="020F0502020204030204" pitchFamily="34" charset="0"/>
+              </a:rPr>
+              <a:t>and Data </a:t>
+            </a:r>
+            <a:r>
+              <a:rPr lang="en-US" sz="2800" dirty="0" smtClean="0">
+                <a:latin typeface="Calibri" panose="020F0502020204030204" pitchFamily="34" charset="0"/>
+                <a:cs typeface="Calibri" panose="020F0502020204030204" pitchFamily="34" charset="0"/>
+              </a:rPr>
+              <a:t>Visualization</a:t>
+            </a:r>
+            <a:endParaRPr lang="en-US" sz="2800" dirty="0">
+              <a:latin typeface="Calibri" panose="020F0502020204030204" pitchFamily="34" charset="0"/>
+              <a:cs typeface="Calibri" panose="020F0502020204030204" pitchFamily="34" charset="0"/>
+            </a:endParaRPr>
+          </a:p>
+          <a:p>
+            <a:pPr marL="109728" indent="0" algn="ctr">
+              <a:buNone/>
+            </a:pPr>
+            <a:r>
+              <a:rPr lang="en-US" sz="2400" dirty="0">
+                <a:latin typeface="Calibri" panose="020F0502020204030204" pitchFamily="34" charset="0"/>
+                <a:cs typeface="Calibri" panose="020F0502020204030204" pitchFamily="34" charset="0"/>
+              </a:rPr>
+              <a:t>Basic </a:t>
+            </a:r>
+            <a:r>
+              <a:rPr lang="en-US" sz="2400" dirty="0" smtClean="0">
+                <a:latin typeface="Calibri" panose="020F0502020204030204" pitchFamily="34" charset="0"/>
+                <a:cs typeface="Calibri" panose="020F0502020204030204" pitchFamily="34" charset="0"/>
+              </a:rPr>
+              <a:t>Statistics </a:t>
+            </a:r>
+            <a:r>
+              <a:rPr lang="en-US" sz="2400" dirty="0">
+                <a:latin typeface="Calibri" panose="020F0502020204030204" pitchFamily="34" charset="0"/>
+                <a:cs typeface="Calibri" panose="020F0502020204030204" pitchFamily="34" charset="0"/>
+              </a:rPr>
+              <a:t>and </a:t>
+            </a:r>
+            <a:r>
+              <a:rPr lang="en-US" sz="2400" dirty="0" smtClean="0">
+                <a:latin typeface="Calibri" panose="020F0502020204030204" pitchFamily="34" charset="0"/>
+                <a:cs typeface="Calibri" panose="020F0502020204030204" pitchFamily="34" charset="0"/>
+              </a:rPr>
+              <a:t>Visualization- Breach X Organization Types</a:t>
+            </a:r>
+          </a:p>
+          <a:p>
+            <a:pPr marL="109728" indent="0">
+              <a:buNone/>
+            </a:pPr>
+            <a:r>
+              <a:rPr lang="en-US" sz="1600" dirty="0" smtClean="0">
+                <a:latin typeface="Calibri" panose="020F0502020204030204" pitchFamily="34" charset="0"/>
+                <a:cs typeface="Calibri" panose="020F0502020204030204" pitchFamily="34" charset="0"/>
+              </a:rPr>
+              <a:t>Organizations Y</a:t>
+            </a:r>
+            <a:endParaRPr lang="en-US" sz="1600" dirty="0">
+              <a:latin typeface="Calibri" panose="020F0502020204030204" pitchFamily="34" charset="0"/>
+              <a:cs typeface="Calibri" panose="020F0502020204030204" pitchFamily="34" charset="0"/>
+            </a:endParaRPr>
+          </a:p>
+          <a:p>
+            <a:r>
+              <a:rPr lang="en-US" sz="1200" dirty="0">
+                <a:latin typeface="Calibri" panose="020F0502020204030204" pitchFamily="34" charset="0"/>
+                <a:cs typeface="Calibri" panose="020F0502020204030204" pitchFamily="34" charset="0"/>
+              </a:rPr>
+              <a:t>1 BSF - Businesses - Financial and Insurance Services</a:t>
+            </a:r>
+          </a:p>
+          <a:p>
+            <a:r>
+              <a:rPr lang="en-US" sz="1200" dirty="0">
+                <a:latin typeface="Calibri" panose="020F0502020204030204" pitchFamily="34" charset="0"/>
+                <a:cs typeface="Calibri" panose="020F0502020204030204" pitchFamily="34" charset="0"/>
+              </a:rPr>
+              <a:t>2 BSO - Businesses - Other</a:t>
+            </a:r>
+          </a:p>
+          <a:p>
+            <a:r>
+              <a:rPr lang="en-US" sz="1200" dirty="0">
+                <a:latin typeface="Calibri" panose="020F0502020204030204" pitchFamily="34" charset="0"/>
+                <a:cs typeface="Calibri" panose="020F0502020204030204" pitchFamily="34" charset="0"/>
+              </a:rPr>
+              <a:t>3 BSR - Businesses - Retail/Merchant – </a:t>
+            </a:r>
+            <a:endParaRPr lang="en-US" sz="1200" dirty="0" smtClean="0">
+              <a:latin typeface="Calibri" panose="020F0502020204030204" pitchFamily="34" charset="0"/>
+              <a:cs typeface="Calibri" panose="020F0502020204030204" pitchFamily="34" charset="0"/>
+            </a:endParaRPr>
+          </a:p>
+          <a:p>
+            <a:pPr marL="109728" indent="0">
+              <a:buNone/>
+            </a:pPr>
+            <a:r>
+              <a:rPr lang="en-US" sz="1200" dirty="0">
+                <a:latin typeface="Calibri" panose="020F0502020204030204" pitchFamily="34" charset="0"/>
+                <a:cs typeface="Calibri" panose="020F0502020204030204" pitchFamily="34" charset="0"/>
+              </a:rPr>
+              <a:t>	</a:t>
+            </a:r>
+            <a:r>
+              <a:rPr lang="en-US" sz="1200" dirty="0" smtClean="0">
+                <a:latin typeface="Calibri" panose="020F0502020204030204" pitchFamily="34" charset="0"/>
+                <a:cs typeface="Calibri" panose="020F0502020204030204" pitchFamily="34" charset="0"/>
+              </a:rPr>
+              <a:t>Including </a:t>
+            </a:r>
+            <a:r>
+              <a:rPr lang="en-US" sz="1200" dirty="0">
+                <a:latin typeface="Calibri" panose="020F0502020204030204" pitchFamily="34" charset="0"/>
+                <a:cs typeface="Calibri" panose="020F0502020204030204" pitchFamily="34" charset="0"/>
+              </a:rPr>
+              <a:t>Online Retail</a:t>
+            </a:r>
+          </a:p>
+          <a:p>
+            <a:r>
+              <a:rPr lang="en-US" sz="1200" dirty="0">
+                <a:latin typeface="Calibri" panose="020F0502020204030204" pitchFamily="34" charset="0"/>
+                <a:cs typeface="Calibri" panose="020F0502020204030204" pitchFamily="34" charset="0"/>
+              </a:rPr>
+              <a:t>4 EDU - Educational Institutions</a:t>
+            </a:r>
+          </a:p>
+          <a:p>
+            <a:r>
+              <a:rPr lang="en-US" sz="1200" dirty="0">
+                <a:latin typeface="Calibri" panose="020F0502020204030204" pitchFamily="34" charset="0"/>
+                <a:cs typeface="Calibri" panose="020F0502020204030204" pitchFamily="34" charset="0"/>
+              </a:rPr>
+              <a:t>5 GOV - Government &amp; Military</a:t>
+            </a:r>
+          </a:p>
+          <a:p>
+            <a:r>
+              <a:rPr lang="en-US" sz="1200" dirty="0">
+                <a:latin typeface="Calibri" panose="020F0502020204030204" pitchFamily="34" charset="0"/>
+                <a:cs typeface="Calibri" panose="020F0502020204030204" pitchFamily="34" charset="0"/>
+              </a:rPr>
+              <a:t>6 MED - Healthcare </a:t>
+            </a:r>
+            <a:endParaRPr lang="en-US" sz="1200" dirty="0" smtClean="0">
+              <a:latin typeface="Calibri" panose="020F0502020204030204" pitchFamily="34" charset="0"/>
+              <a:cs typeface="Calibri" panose="020F0502020204030204" pitchFamily="34" charset="0"/>
+            </a:endParaRPr>
+          </a:p>
+          <a:p>
+            <a:r>
+              <a:rPr lang="en-US" sz="1200" dirty="0" smtClean="0">
+                <a:latin typeface="Calibri" panose="020F0502020204030204" pitchFamily="34" charset="0"/>
+                <a:cs typeface="Calibri" panose="020F0502020204030204" pitchFamily="34" charset="0"/>
+              </a:rPr>
+              <a:t>7 </a:t>
+            </a:r>
+            <a:r>
+              <a:rPr lang="en-US" sz="1200" dirty="0">
+                <a:latin typeface="Calibri" panose="020F0502020204030204" pitchFamily="34" charset="0"/>
+                <a:cs typeface="Calibri" panose="020F0502020204030204" pitchFamily="34" charset="0"/>
+              </a:rPr>
+              <a:t>NGO - Nonprofit Organizations</a:t>
+            </a:r>
+          </a:p>
+          <a:p>
+            <a:pPr marL="109728" indent="0">
+              <a:buNone/>
+            </a:pPr>
+            <a:r>
+              <a:rPr lang="en-US" sz="1200" dirty="0" smtClean="0">
+                <a:latin typeface="Calibri" panose="020F0502020204030204" pitchFamily="34" charset="0"/>
+                <a:cs typeface="Calibri" panose="020F0502020204030204" pitchFamily="34" charset="0"/>
+              </a:rPr>
+              <a:t>Breach X</a:t>
+            </a:r>
+          </a:p>
+          <a:p>
+            <a:r>
+              <a:rPr lang="en-US" sz="1200" dirty="0" smtClean="0">
+                <a:latin typeface="Calibri" panose="020F0502020204030204" pitchFamily="34" charset="0"/>
+                <a:cs typeface="Calibri" panose="020F0502020204030204" pitchFamily="34" charset="0"/>
+              </a:rPr>
+              <a:t>1</a:t>
+            </a:r>
+            <a:r>
+              <a:rPr lang="en-US" sz="1200" dirty="0">
+                <a:latin typeface="Calibri" panose="020F0502020204030204" pitchFamily="34" charset="0"/>
+                <a:cs typeface="Calibri" panose="020F0502020204030204" pitchFamily="34" charset="0"/>
+              </a:rPr>
+              <a:t>: CARD - Payment Card Fraud: </a:t>
+            </a:r>
+            <a:endParaRPr lang="en-US" sz="1200" dirty="0" smtClean="0">
+              <a:latin typeface="Calibri" panose="020F0502020204030204" pitchFamily="34" charset="0"/>
+              <a:cs typeface="Calibri" panose="020F0502020204030204" pitchFamily="34" charset="0"/>
+            </a:endParaRPr>
+          </a:p>
+          <a:p>
+            <a:r>
+              <a:rPr lang="en-US" sz="1200" dirty="0" smtClean="0">
+                <a:latin typeface="Calibri" panose="020F0502020204030204" pitchFamily="34" charset="0"/>
+                <a:cs typeface="Calibri" panose="020F0502020204030204" pitchFamily="34" charset="0"/>
+              </a:rPr>
+              <a:t>2</a:t>
+            </a:r>
+            <a:r>
+              <a:rPr lang="en-US" sz="1200" dirty="0">
+                <a:latin typeface="Calibri" panose="020F0502020204030204" pitchFamily="34" charset="0"/>
+                <a:cs typeface="Calibri" panose="020F0502020204030204" pitchFamily="34" charset="0"/>
+              </a:rPr>
+              <a:t>: HACK - Hacking or </a:t>
+            </a:r>
+            <a:r>
+              <a:rPr lang="en-US" sz="1200" dirty="0" smtClean="0">
+                <a:latin typeface="Calibri" panose="020F0502020204030204" pitchFamily="34" charset="0"/>
+                <a:cs typeface="Calibri" panose="020F0502020204030204" pitchFamily="34" charset="0"/>
+              </a:rPr>
+              <a:t>Malware</a:t>
+            </a:r>
+          </a:p>
+          <a:p>
+            <a:r>
+              <a:rPr lang="en-US" sz="1200" dirty="0" smtClean="0">
+                <a:latin typeface="Calibri" panose="020F0502020204030204" pitchFamily="34" charset="0"/>
+                <a:cs typeface="Calibri" panose="020F0502020204030204" pitchFamily="34" charset="0"/>
+              </a:rPr>
+              <a:t>3</a:t>
+            </a:r>
+            <a:r>
+              <a:rPr lang="en-US" sz="1200" dirty="0">
+                <a:latin typeface="Calibri" panose="020F0502020204030204" pitchFamily="34" charset="0"/>
+                <a:cs typeface="Calibri" panose="020F0502020204030204" pitchFamily="34" charset="0"/>
+              </a:rPr>
+              <a:t>: INSD </a:t>
+            </a:r>
+            <a:r>
+              <a:rPr lang="en-US" sz="1200" dirty="0" smtClean="0">
+                <a:latin typeface="Calibri" panose="020F0502020204030204" pitchFamily="34" charset="0"/>
+                <a:cs typeface="Calibri" panose="020F0502020204030204" pitchFamily="34" charset="0"/>
+              </a:rPr>
+              <a:t>– Insider</a:t>
+            </a:r>
+          </a:p>
+          <a:p>
+            <a:r>
+              <a:rPr lang="en-US" sz="1200" dirty="0" smtClean="0">
+                <a:latin typeface="Calibri" panose="020F0502020204030204" pitchFamily="34" charset="0"/>
+                <a:cs typeface="Calibri" panose="020F0502020204030204" pitchFamily="34" charset="0"/>
+              </a:rPr>
+              <a:t>4</a:t>
+            </a:r>
+            <a:r>
+              <a:rPr lang="en-US" sz="1200" dirty="0">
+                <a:latin typeface="Calibri" panose="020F0502020204030204" pitchFamily="34" charset="0"/>
+                <a:cs typeface="Calibri" panose="020F0502020204030204" pitchFamily="34" charset="0"/>
+              </a:rPr>
+              <a:t>: PHYS - Physical </a:t>
+            </a:r>
+            <a:r>
+              <a:rPr lang="en-US" sz="1200" dirty="0" smtClean="0">
+                <a:latin typeface="Calibri" panose="020F0502020204030204" pitchFamily="34" charset="0"/>
+                <a:cs typeface="Calibri" panose="020F0502020204030204" pitchFamily="34" charset="0"/>
+              </a:rPr>
+              <a:t>Loss</a:t>
+            </a:r>
+          </a:p>
+          <a:p>
+            <a:r>
+              <a:rPr lang="en-US" sz="1200" dirty="0" smtClean="0">
+                <a:latin typeface="Calibri" panose="020F0502020204030204" pitchFamily="34" charset="0"/>
+                <a:cs typeface="Calibri" panose="020F0502020204030204" pitchFamily="34" charset="0"/>
+              </a:rPr>
+              <a:t>5</a:t>
+            </a:r>
+            <a:r>
+              <a:rPr lang="en-US" sz="1200" dirty="0">
+                <a:latin typeface="Calibri" panose="020F0502020204030204" pitchFamily="34" charset="0"/>
+                <a:cs typeface="Calibri" panose="020F0502020204030204" pitchFamily="34" charset="0"/>
+              </a:rPr>
+              <a:t>: PORT - Portable </a:t>
+            </a:r>
+            <a:r>
+              <a:rPr lang="en-US" sz="1200" dirty="0" smtClean="0">
+                <a:latin typeface="Calibri" panose="020F0502020204030204" pitchFamily="34" charset="0"/>
+                <a:cs typeface="Calibri" panose="020F0502020204030204" pitchFamily="34" charset="0"/>
+              </a:rPr>
+              <a:t>Device</a:t>
+            </a:r>
+          </a:p>
+          <a:p>
+            <a:r>
+              <a:rPr lang="en-US" sz="1200" dirty="0" smtClean="0">
+                <a:latin typeface="Calibri" panose="020F0502020204030204" pitchFamily="34" charset="0"/>
+                <a:cs typeface="Calibri" panose="020F0502020204030204" pitchFamily="34" charset="0"/>
+              </a:rPr>
+              <a:t>6</a:t>
+            </a:r>
+            <a:r>
+              <a:rPr lang="en-US" sz="1200" dirty="0">
+                <a:latin typeface="Calibri" panose="020F0502020204030204" pitchFamily="34" charset="0"/>
+                <a:cs typeface="Calibri" panose="020F0502020204030204" pitchFamily="34" charset="0"/>
+              </a:rPr>
+              <a:t>: STAT - Stationary </a:t>
+            </a:r>
+            <a:r>
+              <a:rPr lang="en-US" sz="1200" dirty="0" smtClean="0">
+                <a:latin typeface="Calibri" panose="020F0502020204030204" pitchFamily="34" charset="0"/>
+                <a:cs typeface="Calibri" panose="020F0502020204030204" pitchFamily="34" charset="0"/>
+              </a:rPr>
+              <a:t>Device</a:t>
+            </a:r>
+          </a:p>
+          <a:p>
+            <a:r>
+              <a:rPr lang="en-US" sz="1200" dirty="0" smtClean="0">
+                <a:latin typeface="Calibri" panose="020F0502020204030204" pitchFamily="34" charset="0"/>
+                <a:cs typeface="Calibri" panose="020F0502020204030204" pitchFamily="34" charset="0"/>
+              </a:rPr>
+              <a:t>7: DISC </a:t>
+            </a:r>
+            <a:r>
+              <a:rPr lang="en-US" sz="1200" dirty="0">
+                <a:latin typeface="Calibri" panose="020F0502020204030204" pitchFamily="34" charset="0"/>
+                <a:cs typeface="Calibri" panose="020F0502020204030204" pitchFamily="34" charset="0"/>
+              </a:rPr>
+              <a:t>- Unintended </a:t>
+            </a:r>
+            <a:r>
+              <a:rPr lang="en-US" sz="1200" dirty="0" smtClean="0">
+                <a:latin typeface="Calibri" panose="020F0502020204030204" pitchFamily="34" charset="0"/>
+                <a:cs typeface="Calibri" panose="020F0502020204030204" pitchFamily="34" charset="0"/>
+              </a:rPr>
+              <a:t>Disclosure</a:t>
+            </a:r>
+          </a:p>
+          <a:p>
+            <a:r>
+              <a:rPr lang="en-US" sz="1200" dirty="0" smtClean="0">
+                <a:latin typeface="Calibri" panose="020F0502020204030204" pitchFamily="34" charset="0"/>
+                <a:cs typeface="Calibri" panose="020F0502020204030204" pitchFamily="34" charset="0"/>
+              </a:rPr>
+              <a:t>0</a:t>
+            </a:r>
+            <a:r>
+              <a:rPr lang="en-US" sz="1200" dirty="0">
+                <a:latin typeface="Calibri" panose="020F0502020204030204" pitchFamily="34" charset="0"/>
+                <a:cs typeface="Calibri" panose="020F0502020204030204" pitchFamily="34" charset="0"/>
+              </a:rPr>
+              <a:t>: </a:t>
+            </a:r>
+            <a:r>
+              <a:rPr lang="en-US" sz="1200" dirty="0" smtClean="0">
+                <a:latin typeface="Calibri" panose="020F0502020204030204" pitchFamily="34" charset="0"/>
+                <a:cs typeface="Calibri" panose="020F0502020204030204" pitchFamily="34" charset="0"/>
+              </a:rPr>
+              <a:t>Unknown</a:t>
+            </a:r>
+          </a:p>
+          <a:p>
+            <a:pPr marL="109728" indent="0">
+              <a:buNone/>
+            </a:pPr>
+            <a:r>
+              <a:rPr lang="en-US" sz="1600" b="1" dirty="0" smtClean="0">
+                <a:latin typeface="Calibri" panose="020F0502020204030204" pitchFamily="34" charset="0"/>
+                <a:cs typeface="Calibri" panose="020F0502020204030204" pitchFamily="34" charset="0"/>
+              </a:rPr>
+              <a:t>Shows  Medical  with the most breaches,  Especially  Hacking and Physical Loss</a:t>
+            </a:r>
+          </a:p>
+          <a:p>
+            <a:endParaRPr lang="en-US" sz="1600" dirty="0" smtClean="0">
+              <a:latin typeface="Calibri" panose="020F0502020204030204" pitchFamily="34" charset="0"/>
+              <a:cs typeface="Calibri" panose="020F0502020204030204" pitchFamily="34" charset="0"/>
+            </a:endParaRPr>
+          </a:p>
+        </p:txBody>
+      </p:sp>
+      <p:pic>
+        <p:nvPicPr>
+          <p:cNvPr id="4" name="Picture 3"/>
+          <p:cNvPicPr>
+            <a:picLocks noChangeAspect="1"/>
+          </p:cNvPicPr>
+          <p:nvPr/>
+        </p:nvPicPr>
+        <p:blipFill>
+          <a:blip r:embed="rId2">
+            <a:extLst>
+              <a:ext uri="{28A0092B-C50C-407E-A947-70E740481C1C}">
+                <a14:useLocalDpi xmlns:a14="http://schemas.microsoft.com/office/drawing/2010/main" val="0"/>
+              </a:ext>
+            </a:extLst>
+          </a:blip>
+          <a:stretch>
+            <a:fillRect/>
+          </a:stretch>
+        </p:blipFill>
+        <p:spPr>
+          <a:xfrm>
+            <a:off x="4495800" y="1600200"/>
+            <a:ext cx="3962400" cy="4038600"/>
+          </a:xfrm>
+          <a:prstGeom prst="rect">
+            <a:avLst/>
+          </a:prstGeom>
+        </p:spPr>
+      </p:pic>
+    </p:spTree>
+    <p:extLst>
+      <p:ext uri="{BB962C8B-B14F-4D97-AF65-F5344CB8AC3E}">
+        <p14:creationId xmlns:p14="http://schemas.microsoft.com/office/powerpoint/2010/main" val="2280630171"/>
       </p:ext>
     </p:extLst>
   </p:cSld>
@@ -7154,7 +9135,7 @@
                 <a:latin typeface="Calibri" panose="020F0502020204030204" pitchFamily="34" charset="0"/>
                 <a:cs typeface="Calibri" panose="020F0502020204030204" pitchFamily="34" charset="0"/>
               </a:rPr>
-              <a:t>assessment, Transformation, Cleaning </a:t>
+              <a:t>Assessment, Transformation, Cleaning </a:t>
             </a:r>
             <a:r>
               <a:rPr lang="en-US" sz="5000" dirty="0">

</xml_diff>